<commit_message>
Updates of 10_Intro materials
</commit_message>
<xml_diff>
--- a/10_Intro/WebProg_ClassicWPReview.pptx
+++ b/10_Intro/WebProg_ClassicWPReview.pptx
@@ -16,19 +16,20 @@
     <p:sldId id="357" r:id="rId10"/>
     <p:sldId id="359" r:id="rId11"/>
     <p:sldId id="360" r:id="rId12"/>
-    <p:sldId id="372" r:id="rId13"/>
-    <p:sldId id="373" r:id="rId14"/>
-    <p:sldId id="358" r:id="rId15"/>
-    <p:sldId id="363" r:id="rId16"/>
-    <p:sldId id="364" r:id="rId17"/>
-    <p:sldId id="365" r:id="rId18"/>
-    <p:sldId id="371" r:id="rId19"/>
+    <p:sldId id="358" r:id="rId13"/>
+    <p:sldId id="363" r:id="rId14"/>
+    <p:sldId id="364" r:id="rId15"/>
+    <p:sldId id="365" r:id="rId16"/>
+    <p:sldId id="371" r:id="rId17"/>
+    <p:sldId id="372" r:id="rId18"/>
+    <p:sldId id="373" r:id="rId19"/>
     <p:sldId id="362" r:id="rId20"/>
     <p:sldId id="366" r:id="rId21"/>
     <p:sldId id="367" r:id="rId22"/>
-    <p:sldId id="368" r:id="rId23"/>
-    <p:sldId id="369" r:id="rId24"/>
-    <p:sldId id="370" r:id="rId25"/>
+    <p:sldId id="374" r:id="rId23"/>
+    <p:sldId id="368" r:id="rId24"/>
+    <p:sldId id="369" r:id="rId25"/>
+    <p:sldId id="370" r:id="rId26"/>
   </p:sldIdLst>
   <p:sldSz cx="12192000" cy="6858000"/>
   <p:notesSz cx="6858000" cy="9144000"/>
@@ -266,7 +267,7 @@
           <a:p>
             <a:fld id="{04527E70-C461-477F-BF52-CFCF7D612977}" type="datetimeFigureOut">
               <a:rPr lang="da-DK" smtClean="0"/>
-              <a:t>02-02-2019</a:t>
+              <a:t>06-02-2019</a:t>
             </a:fld>
             <a:endParaRPr lang="da-DK"/>
           </a:p>
@@ -436,7 +437,7 @@
           <a:p>
             <a:fld id="{04527E70-C461-477F-BF52-CFCF7D612977}" type="datetimeFigureOut">
               <a:rPr lang="da-DK" smtClean="0"/>
-              <a:t>02-02-2019</a:t>
+              <a:t>06-02-2019</a:t>
             </a:fld>
             <a:endParaRPr lang="da-DK"/>
           </a:p>
@@ -616,7 +617,7 @@
           <a:p>
             <a:fld id="{04527E70-C461-477F-BF52-CFCF7D612977}" type="datetimeFigureOut">
               <a:rPr lang="da-DK" smtClean="0"/>
-              <a:t>02-02-2019</a:t>
+              <a:t>06-02-2019</a:t>
             </a:fld>
             <a:endParaRPr lang="da-DK"/>
           </a:p>
@@ -786,7 +787,7 @@
           <a:p>
             <a:fld id="{04527E70-C461-477F-BF52-CFCF7D612977}" type="datetimeFigureOut">
               <a:rPr lang="da-DK" smtClean="0"/>
-              <a:t>02-02-2019</a:t>
+              <a:t>06-02-2019</a:t>
             </a:fld>
             <a:endParaRPr lang="da-DK"/>
           </a:p>
@@ -1032,7 +1033,7 @@
           <a:p>
             <a:fld id="{04527E70-C461-477F-BF52-CFCF7D612977}" type="datetimeFigureOut">
               <a:rPr lang="da-DK" smtClean="0"/>
-              <a:t>02-02-2019</a:t>
+              <a:t>06-02-2019</a:t>
             </a:fld>
             <a:endParaRPr lang="da-DK"/>
           </a:p>
@@ -1264,7 +1265,7 @@
           <a:p>
             <a:fld id="{04527E70-C461-477F-BF52-CFCF7D612977}" type="datetimeFigureOut">
               <a:rPr lang="da-DK" smtClean="0"/>
-              <a:t>02-02-2019</a:t>
+              <a:t>06-02-2019</a:t>
             </a:fld>
             <a:endParaRPr lang="da-DK"/>
           </a:p>
@@ -1631,7 +1632,7 @@
           <a:p>
             <a:fld id="{04527E70-C461-477F-BF52-CFCF7D612977}" type="datetimeFigureOut">
               <a:rPr lang="da-DK" smtClean="0"/>
-              <a:t>02-02-2019</a:t>
+              <a:t>06-02-2019</a:t>
             </a:fld>
             <a:endParaRPr lang="da-DK"/>
           </a:p>
@@ -1749,7 +1750,7 @@
           <a:p>
             <a:fld id="{04527E70-C461-477F-BF52-CFCF7D612977}" type="datetimeFigureOut">
               <a:rPr lang="da-DK" smtClean="0"/>
-              <a:t>02-02-2019</a:t>
+              <a:t>06-02-2019</a:t>
             </a:fld>
             <a:endParaRPr lang="da-DK"/>
           </a:p>
@@ -1844,7 +1845,7 @@
           <a:p>
             <a:fld id="{04527E70-C461-477F-BF52-CFCF7D612977}" type="datetimeFigureOut">
               <a:rPr lang="da-DK" smtClean="0"/>
-              <a:t>02-02-2019</a:t>
+              <a:t>06-02-2019</a:t>
             </a:fld>
             <a:endParaRPr lang="da-DK"/>
           </a:p>
@@ -2121,7 +2122,7 @@
           <a:p>
             <a:fld id="{04527E70-C461-477F-BF52-CFCF7D612977}" type="datetimeFigureOut">
               <a:rPr lang="da-DK" smtClean="0"/>
-              <a:t>02-02-2019</a:t>
+              <a:t>06-02-2019</a:t>
             </a:fld>
             <a:endParaRPr lang="da-DK"/>
           </a:p>
@@ -2374,7 +2375,7 @@
           <a:p>
             <a:fld id="{04527E70-C461-477F-BF52-CFCF7D612977}" type="datetimeFigureOut">
               <a:rPr lang="da-DK" smtClean="0"/>
-              <a:t>02-02-2019</a:t>
+              <a:t>06-02-2019</a:t>
             </a:fld>
             <a:endParaRPr lang="da-DK"/>
           </a:p>
@@ -2587,7 +2588,7 @@
           <a:p>
             <a:fld id="{04527E70-C461-477F-BF52-CFCF7D612977}" type="datetimeFigureOut">
               <a:rPr lang="da-DK" smtClean="0"/>
-              <a:t>02-02-2019</a:t>
+              <a:t>06-02-2019</a:t>
             </a:fld>
             <a:endParaRPr lang="da-DK"/>
           </a:p>
@@ -3422,11 +3423,7 @@
             </a:r>
             <a:r>
               <a:rPr lang="da-DK" b="1"/>
-              <a:t>color </a:t>
-            </a:r>
-            <a:r>
-              <a:rPr lang="da-DK" b="1"/>
-              <a:t>: </a:t>
+              <a:t>color : </a:t>
             </a:r>
             <a:r>
               <a:rPr lang="da-DK" b="1" smtClean="0"/>
@@ -3479,6 +3476,1055 @@
       </p:grpSpPr>
       <p:sp>
         <p:nvSpPr>
+          <p:cNvPr id="4" name="Ellipse 3"/>
+          <p:cNvSpPr/>
+          <p:nvPr/>
+        </p:nvSpPr>
+        <p:spPr>
+          <a:xfrm>
+            <a:off x="4010256" y="1627269"/>
+            <a:ext cx="3600000" cy="3600000"/>
+          </a:xfrm>
+          <a:prstGeom prst="ellipse">
+            <a:avLst/>
+          </a:prstGeom>
+        </p:spPr>
+        <p:style>
+          <a:lnRef idx="2">
+            <a:schemeClr val="accent1">
+              <a:shade val="50000"/>
+            </a:schemeClr>
+          </a:lnRef>
+          <a:fillRef idx="1">
+            <a:schemeClr val="accent1"/>
+          </a:fillRef>
+          <a:effectRef idx="0">
+            <a:schemeClr val="accent1"/>
+          </a:effectRef>
+          <a:fontRef idx="minor">
+            <a:schemeClr val="lt1"/>
+          </a:fontRef>
+        </p:style>
+        <p:txBody>
+          <a:bodyPr rtlCol="0" anchor="ctr"/>
+          <a:lstStyle/>
+          <a:p>
+            <a:pPr algn="ctr"/>
+            <a:r>
+              <a:rPr lang="da-DK" sz="4800" smtClean="0"/>
+              <a:t>DOM</a:t>
+            </a:r>
+            <a:endParaRPr lang="da-DK" sz="4800"/>
+          </a:p>
+        </p:txBody>
+      </p:sp>
+      <p:sp>
+        <p:nvSpPr>
+          <p:cNvPr id="5" name="Rektangel 4"/>
+          <p:cNvSpPr/>
+          <p:nvPr/>
+        </p:nvSpPr>
+        <p:spPr>
+          <a:xfrm>
+            <a:off x="2351206" y="660242"/>
+            <a:ext cx="2160000" cy="2160000"/>
+          </a:xfrm>
+          <a:prstGeom prst="rect">
+            <a:avLst/>
+          </a:prstGeom>
+          <a:solidFill>
+            <a:schemeClr val="accent6">
+              <a:lumMod val="75000"/>
+            </a:schemeClr>
+          </a:solidFill>
+        </p:spPr>
+        <p:style>
+          <a:lnRef idx="2">
+            <a:schemeClr val="accent1">
+              <a:shade val="50000"/>
+            </a:schemeClr>
+          </a:lnRef>
+          <a:fillRef idx="1">
+            <a:schemeClr val="accent1"/>
+          </a:fillRef>
+          <a:effectRef idx="0">
+            <a:schemeClr val="accent1"/>
+          </a:effectRef>
+          <a:fontRef idx="minor">
+            <a:schemeClr val="lt1"/>
+          </a:fontRef>
+        </p:style>
+        <p:txBody>
+          <a:bodyPr rtlCol="0" anchor="t"/>
+          <a:lstStyle/>
+          <a:p>
+            <a:pPr algn="ctr"/>
+            <a:r>
+              <a:rPr lang="da-DK" sz="3200" smtClean="0">
+                <a:solidFill>
+                  <a:srgbClr val="FFFF00"/>
+                </a:solidFill>
+              </a:rPr>
+              <a:t>HTML</a:t>
+            </a:r>
+          </a:p>
+          <a:p>
+            <a:pPr algn="ctr"/>
+            <a:r>
+              <a:rPr lang="da-DK" sz="2000" smtClean="0">
+                <a:solidFill>
+                  <a:schemeClr val="bg1"/>
+                </a:solidFill>
+              </a:rPr>
+              <a:t>(structure)</a:t>
+            </a:r>
+          </a:p>
+          <a:p>
+            <a:pPr algn="ctr"/>
+            <a:r>
+              <a:rPr lang="da-DK" sz="2000" smtClean="0">
+                <a:solidFill>
+                  <a:schemeClr val="bg1">
+                    <a:lumMod val="65000"/>
+                  </a:schemeClr>
+                </a:solidFill>
+              </a:rPr>
+              <a:t>(layout)</a:t>
+            </a:r>
+          </a:p>
+          <a:p>
+            <a:pPr algn="ctr"/>
+            <a:r>
+              <a:rPr lang="da-DK" sz="2000" smtClean="0">
+                <a:solidFill>
+                  <a:schemeClr val="bg1"/>
+                </a:solidFill>
+              </a:rPr>
+              <a:t>(interactivity)</a:t>
+            </a:r>
+            <a:endParaRPr lang="da-DK" sz="2000">
+              <a:solidFill>
+                <a:schemeClr val="bg1"/>
+              </a:solidFill>
+            </a:endParaRPr>
+          </a:p>
+        </p:txBody>
+      </p:sp>
+      <p:sp>
+        <p:nvSpPr>
+          <p:cNvPr id="6" name="Rektangel 5"/>
+          <p:cNvSpPr/>
+          <p:nvPr/>
+        </p:nvSpPr>
+        <p:spPr>
+          <a:xfrm>
+            <a:off x="7085081" y="660242"/>
+            <a:ext cx="2160000" cy="2160000"/>
+          </a:xfrm>
+          <a:prstGeom prst="rect">
+            <a:avLst/>
+          </a:prstGeom>
+          <a:solidFill>
+            <a:srgbClr val="C00000"/>
+          </a:solidFill>
+        </p:spPr>
+        <p:style>
+          <a:lnRef idx="2">
+            <a:schemeClr val="accent1">
+              <a:shade val="50000"/>
+            </a:schemeClr>
+          </a:lnRef>
+          <a:fillRef idx="1">
+            <a:schemeClr val="accent1"/>
+          </a:fillRef>
+          <a:effectRef idx="0">
+            <a:schemeClr val="accent1"/>
+          </a:effectRef>
+          <a:fontRef idx="minor">
+            <a:schemeClr val="lt1"/>
+          </a:fontRef>
+        </p:style>
+        <p:txBody>
+          <a:bodyPr rtlCol="0" anchor="t"/>
+          <a:lstStyle/>
+          <a:p>
+            <a:pPr algn="ctr"/>
+            <a:r>
+              <a:rPr lang="da-DK" sz="3200" smtClean="0">
+                <a:solidFill>
+                  <a:srgbClr val="FFFF00"/>
+                </a:solidFill>
+              </a:rPr>
+              <a:t>CSS</a:t>
+            </a:r>
+          </a:p>
+          <a:p>
+            <a:pPr algn="ctr"/>
+            <a:r>
+              <a:rPr lang="da-DK" sz="2000" smtClean="0">
+                <a:solidFill>
+                  <a:schemeClr val="bg1"/>
+                </a:solidFill>
+              </a:rPr>
+              <a:t>(layout)</a:t>
+            </a:r>
+          </a:p>
+        </p:txBody>
+      </p:sp>
+    </p:spTree>
+    <p:extLst>
+      <p:ext uri="{BB962C8B-B14F-4D97-AF65-F5344CB8AC3E}">
+        <p14:creationId xmlns:p14="http://schemas.microsoft.com/office/powerpoint/2010/main" val="3375027990"/>
+      </p:ext>
+    </p:extLst>
+  </p:cSld>
+  <p:clrMapOvr>
+    <a:masterClrMapping/>
+  </p:clrMapOvr>
+  <p:timing>
+    <p:tnLst>
+      <p:par>
+        <p:cTn id="1" dur="indefinite" restart="never" nodeType="tmRoot"/>
+      </p:par>
+    </p:tnLst>
+  </p:timing>
+</p:sld>
+</file>
+
+<file path=ppt/slides/slide13.xml><?xml version="1.0" encoding="utf-8"?>
+<p:sld xmlns:a="http://schemas.openxmlformats.org/drawingml/2006/main" xmlns:r="http://schemas.openxmlformats.org/officeDocument/2006/relationships" xmlns:p="http://schemas.openxmlformats.org/presentationml/2006/main">
+  <p:cSld>
+    <p:spTree>
+      <p:nvGrpSpPr>
+        <p:cNvPr id="1" name=""/>
+        <p:cNvGrpSpPr/>
+        <p:nvPr/>
+      </p:nvGrpSpPr>
+      <p:grpSpPr>
+        <a:xfrm>
+          <a:off x="0" y="0"/>
+          <a:ext cx="0" cy="0"/>
+          <a:chOff x="0" y="0"/>
+          <a:chExt cx="0" cy="0"/>
+        </a:xfrm>
+      </p:grpSpPr>
+      <p:sp>
+        <p:nvSpPr>
+          <p:cNvPr id="2" name="Titel 1"/>
+          <p:cNvSpPr>
+            <a:spLocks noGrp="1"/>
+          </p:cNvSpPr>
+          <p:nvPr>
+            <p:ph type="title"/>
+          </p:nvPr>
+        </p:nvSpPr>
+        <p:spPr/>
+        <p:txBody>
+          <a:bodyPr/>
+          <a:lstStyle/>
+          <a:p>
+            <a:r>
+              <a:rPr lang="da-DK" b="1" smtClean="0"/>
+              <a:t>HTML5</a:t>
+            </a:r>
+            <a:endParaRPr lang="da-DK"/>
+          </a:p>
+        </p:txBody>
+      </p:sp>
+      <p:sp>
+        <p:nvSpPr>
+          <p:cNvPr id="3" name="Pladsholder til indhold 2"/>
+          <p:cNvSpPr>
+            <a:spLocks noGrp="1"/>
+          </p:cNvSpPr>
+          <p:nvPr>
+            <p:ph idx="1"/>
+          </p:nvPr>
+        </p:nvSpPr>
+        <p:spPr>
+          <a:xfrm>
+            <a:off x="838200" y="1825625"/>
+            <a:ext cx="5062151" cy="4351338"/>
+          </a:xfrm>
+        </p:spPr>
+        <p:txBody>
+          <a:bodyPr>
+            <a:normAutofit/>
+          </a:bodyPr>
+          <a:lstStyle/>
+          <a:p>
+            <a:r>
+              <a:rPr lang="da-DK" smtClean="0"/>
+              <a:t>Ideally, </a:t>
+            </a:r>
+            <a:r>
+              <a:rPr lang="da-DK" b="1" smtClean="0"/>
+              <a:t>HTML</a:t>
+            </a:r>
+            <a:r>
+              <a:rPr lang="da-DK" smtClean="0"/>
+              <a:t> should </a:t>
+            </a:r>
+            <a:r>
+              <a:rPr lang="da-DK" u="sng" smtClean="0"/>
+              <a:t>not</a:t>
+            </a:r>
+            <a:r>
+              <a:rPr lang="da-DK" smtClean="0"/>
+              <a:t> in any way define the presentation of a web page</a:t>
+            </a:r>
+          </a:p>
+          <a:p>
+            <a:r>
+              <a:rPr lang="da-DK" smtClean="0"/>
+              <a:t>Ideally, tags like &lt;b&gt;, &lt;br&gt; and &lt;font&gt; should </a:t>
+            </a:r>
+            <a:r>
+              <a:rPr lang="da-DK" u="sng" smtClean="0"/>
+              <a:t>not</a:t>
+            </a:r>
+            <a:r>
+              <a:rPr lang="da-DK" smtClean="0"/>
+              <a:t> be part of </a:t>
+            </a:r>
+            <a:r>
+              <a:rPr lang="da-DK" b="1" smtClean="0"/>
+              <a:t>HTML</a:t>
+            </a:r>
+          </a:p>
+          <a:p>
+            <a:r>
+              <a:rPr lang="da-DK" smtClean="0"/>
+              <a:t>Enter </a:t>
+            </a:r>
+            <a:r>
+              <a:rPr lang="da-DK" b="1" smtClean="0"/>
+              <a:t>HTML5</a:t>
+            </a:r>
+            <a:r>
+              <a:rPr lang="da-DK" smtClean="0"/>
+              <a:t>…</a:t>
+            </a:r>
+          </a:p>
+        </p:txBody>
+      </p:sp>
+      <p:sp>
+        <p:nvSpPr>
+          <p:cNvPr id="4" name="AutoShape 2" descr="Billedresultat for html 5 logo"/>
+          <p:cNvSpPr>
+            <a:spLocks noChangeAspect="1" noChangeArrowheads="1"/>
+          </p:cNvSpPr>
+          <p:nvPr/>
+        </p:nvSpPr>
+        <p:spPr bwMode="auto">
+          <a:xfrm>
+            <a:off x="155575" y="-144463"/>
+            <a:ext cx="304800" cy="304801"/>
+          </a:xfrm>
+          <a:prstGeom prst="rect">
+            <a:avLst/>
+          </a:prstGeom>
+          <a:noFill/>
+          <a:extLst>
+            <a:ext uri="{909E8E84-426E-40DD-AFC4-6F175D3DCCD1}">
+              <a14:hiddenFill xmlns:a14="http://schemas.microsoft.com/office/drawing/2010/main">
+                <a:solidFill>
+                  <a:srgbClr val="FFFFFF"/>
+                </a:solidFill>
+              </a14:hiddenFill>
+            </a:ext>
+          </a:extLst>
+        </p:spPr>
+        <p:txBody>
+          <a:bodyPr vert="horz" wrap="square" lIns="91440" tIns="45720" rIns="91440" bIns="45720" numCol="1" anchor="t" anchorCtr="0" compatLnSpc="1">
+            <a:prstTxWarp prst="textNoShape">
+              <a:avLst/>
+            </a:prstTxWarp>
+          </a:bodyPr>
+          <a:lstStyle/>
+          <a:p>
+            <a:endParaRPr lang="da-DK"/>
+          </a:p>
+        </p:txBody>
+      </p:sp>
+      <p:sp>
+        <p:nvSpPr>
+          <p:cNvPr id="5" name="AutoShape 4" descr="Billedresultat for html 5 logo"/>
+          <p:cNvSpPr>
+            <a:spLocks noChangeAspect="1" noChangeArrowheads="1"/>
+          </p:cNvSpPr>
+          <p:nvPr/>
+        </p:nvSpPr>
+        <p:spPr bwMode="auto">
+          <a:xfrm>
+            <a:off x="307975" y="7937"/>
+            <a:ext cx="304800" cy="304801"/>
+          </a:xfrm>
+          <a:prstGeom prst="rect">
+            <a:avLst/>
+          </a:prstGeom>
+          <a:noFill/>
+          <a:extLst>
+            <a:ext uri="{909E8E84-426E-40DD-AFC4-6F175D3DCCD1}">
+              <a14:hiddenFill xmlns:a14="http://schemas.microsoft.com/office/drawing/2010/main">
+                <a:solidFill>
+                  <a:srgbClr val="FFFFFF"/>
+                </a:solidFill>
+              </a14:hiddenFill>
+            </a:ext>
+          </a:extLst>
+        </p:spPr>
+        <p:txBody>
+          <a:bodyPr vert="horz" wrap="square" lIns="91440" tIns="45720" rIns="91440" bIns="45720" numCol="1" anchor="t" anchorCtr="0" compatLnSpc="1">
+            <a:prstTxWarp prst="textNoShape">
+              <a:avLst/>
+            </a:prstTxWarp>
+          </a:bodyPr>
+          <a:lstStyle/>
+          <a:p>
+            <a:endParaRPr lang="da-DK"/>
+          </a:p>
+        </p:txBody>
+      </p:sp>
+      <p:pic>
+        <p:nvPicPr>
+          <p:cNvPr id="6" name="Billede 5"/>
+          <p:cNvPicPr>
+            <a:picLocks noChangeAspect="1"/>
+          </p:cNvPicPr>
+          <p:nvPr/>
+        </p:nvPicPr>
+        <p:blipFill>
+          <a:blip r:embed="rId2"/>
+          <a:stretch>
+            <a:fillRect/>
+          </a:stretch>
+        </p:blipFill>
+        <p:spPr>
+          <a:xfrm>
+            <a:off x="8381228" y="1186377"/>
+            <a:ext cx="3028950" cy="3990975"/>
+          </a:xfrm>
+          <a:prstGeom prst="rect">
+            <a:avLst/>
+          </a:prstGeom>
+        </p:spPr>
+      </p:pic>
+    </p:spTree>
+    <p:extLst>
+      <p:ext uri="{BB962C8B-B14F-4D97-AF65-F5344CB8AC3E}">
+        <p14:creationId xmlns:p14="http://schemas.microsoft.com/office/powerpoint/2010/main" val="3545764893"/>
+      </p:ext>
+    </p:extLst>
+  </p:cSld>
+  <p:clrMapOvr>
+    <a:masterClrMapping/>
+  </p:clrMapOvr>
+  <p:timing>
+    <p:tnLst>
+      <p:par>
+        <p:cTn id="1" dur="indefinite" restart="never" nodeType="tmRoot"/>
+      </p:par>
+    </p:tnLst>
+  </p:timing>
+</p:sld>
+</file>
+
+<file path=ppt/slides/slide14.xml><?xml version="1.0" encoding="utf-8"?>
+<p:sld xmlns:a="http://schemas.openxmlformats.org/drawingml/2006/main" xmlns:r="http://schemas.openxmlformats.org/officeDocument/2006/relationships" xmlns:p="http://schemas.openxmlformats.org/presentationml/2006/main">
+  <p:cSld>
+    <p:spTree>
+      <p:nvGrpSpPr>
+        <p:cNvPr id="1" name=""/>
+        <p:cNvGrpSpPr/>
+        <p:nvPr/>
+      </p:nvGrpSpPr>
+      <p:grpSpPr>
+        <a:xfrm>
+          <a:off x="0" y="0"/>
+          <a:ext cx="0" cy="0"/>
+          <a:chOff x="0" y="0"/>
+          <a:chExt cx="0" cy="0"/>
+        </a:xfrm>
+      </p:grpSpPr>
+      <p:sp>
+        <p:nvSpPr>
+          <p:cNvPr id="2" name="Titel 1"/>
+          <p:cNvSpPr>
+            <a:spLocks noGrp="1"/>
+          </p:cNvSpPr>
+          <p:nvPr>
+            <p:ph type="title"/>
+          </p:nvPr>
+        </p:nvSpPr>
+        <p:spPr/>
+        <p:txBody>
+          <a:bodyPr/>
+          <a:lstStyle/>
+          <a:p>
+            <a:r>
+              <a:rPr lang="da-DK" b="1" smtClean="0"/>
+              <a:t>HTML5</a:t>
+            </a:r>
+            <a:endParaRPr lang="da-DK"/>
+          </a:p>
+        </p:txBody>
+      </p:sp>
+      <p:sp>
+        <p:nvSpPr>
+          <p:cNvPr id="3" name="Pladsholder til indhold 2"/>
+          <p:cNvSpPr>
+            <a:spLocks noGrp="1"/>
+          </p:cNvSpPr>
+          <p:nvPr>
+            <p:ph idx="1"/>
+          </p:nvPr>
+        </p:nvSpPr>
+        <p:spPr>
+          <a:xfrm>
+            <a:off x="838200" y="1825625"/>
+            <a:ext cx="6606746" cy="4351338"/>
+          </a:xfrm>
+        </p:spPr>
+        <p:txBody>
+          <a:bodyPr>
+            <a:normAutofit/>
+          </a:bodyPr>
+          <a:lstStyle/>
+          <a:p>
+            <a:r>
+              <a:rPr lang="da-DK" smtClean="0"/>
+              <a:t>Noteworthy new elements in HTML5:</a:t>
+            </a:r>
+          </a:p>
+          <a:p>
+            <a:pPr lvl="1"/>
+            <a:r>
+              <a:rPr lang="da-DK" b="1" smtClean="0"/>
+              <a:t>Semantic tags</a:t>
+            </a:r>
+            <a:r>
+              <a:rPr lang="da-DK" smtClean="0"/>
+              <a:t>: &lt;header&gt;, &lt;footer&gt;, &lt;article&gt;, &lt;section&gt;, &lt;summary&gt;, etc.. </a:t>
+            </a:r>
+          </a:p>
+          <a:p>
+            <a:pPr lvl="1"/>
+            <a:r>
+              <a:rPr lang="da-DK" b="1" smtClean="0"/>
+              <a:t>Graphics and Media tags</a:t>
+            </a:r>
+            <a:r>
+              <a:rPr lang="da-DK" smtClean="0"/>
+              <a:t>: &lt;canvas&gt;, &lt;svg&gt;, &lt;audio&gt;, &lt;video&gt;, etc..</a:t>
+            </a:r>
+          </a:p>
+          <a:p>
+            <a:pPr lvl="1"/>
+            <a:r>
+              <a:rPr lang="da-DK" b="1" smtClean="0"/>
+              <a:t>APIs</a:t>
+            </a:r>
+            <a:r>
+              <a:rPr lang="da-DK" smtClean="0"/>
+              <a:t>: Geolocation, Local Storage, Web Workers,…</a:t>
+            </a:r>
+          </a:p>
+        </p:txBody>
+      </p:sp>
+      <p:sp>
+        <p:nvSpPr>
+          <p:cNvPr id="4" name="AutoShape 2" descr="Billedresultat for html 5 logo"/>
+          <p:cNvSpPr>
+            <a:spLocks noChangeAspect="1" noChangeArrowheads="1"/>
+          </p:cNvSpPr>
+          <p:nvPr/>
+        </p:nvSpPr>
+        <p:spPr bwMode="auto">
+          <a:xfrm>
+            <a:off x="155575" y="-144463"/>
+            <a:ext cx="304800" cy="304801"/>
+          </a:xfrm>
+          <a:prstGeom prst="rect">
+            <a:avLst/>
+          </a:prstGeom>
+          <a:noFill/>
+          <a:extLst>
+            <a:ext uri="{909E8E84-426E-40DD-AFC4-6F175D3DCCD1}">
+              <a14:hiddenFill xmlns:a14="http://schemas.microsoft.com/office/drawing/2010/main">
+                <a:solidFill>
+                  <a:srgbClr val="FFFFFF"/>
+                </a:solidFill>
+              </a14:hiddenFill>
+            </a:ext>
+          </a:extLst>
+        </p:spPr>
+        <p:txBody>
+          <a:bodyPr vert="horz" wrap="square" lIns="91440" tIns="45720" rIns="91440" bIns="45720" numCol="1" anchor="t" anchorCtr="0" compatLnSpc="1">
+            <a:prstTxWarp prst="textNoShape">
+              <a:avLst/>
+            </a:prstTxWarp>
+          </a:bodyPr>
+          <a:lstStyle/>
+          <a:p>
+            <a:endParaRPr lang="da-DK"/>
+          </a:p>
+        </p:txBody>
+      </p:sp>
+      <p:sp>
+        <p:nvSpPr>
+          <p:cNvPr id="5" name="AutoShape 4" descr="Billedresultat for html 5 logo"/>
+          <p:cNvSpPr>
+            <a:spLocks noChangeAspect="1" noChangeArrowheads="1"/>
+          </p:cNvSpPr>
+          <p:nvPr/>
+        </p:nvSpPr>
+        <p:spPr bwMode="auto">
+          <a:xfrm>
+            <a:off x="307975" y="7937"/>
+            <a:ext cx="304800" cy="304801"/>
+          </a:xfrm>
+          <a:prstGeom prst="rect">
+            <a:avLst/>
+          </a:prstGeom>
+          <a:noFill/>
+          <a:extLst>
+            <a:ext uri="{909E8E84-426E-40DD-AFC4-6F175D3DCCD1}">
+              <a14:hiddenFill xmlns:a14="http://schemas.microsoft.com/office/drawing/2010/main">
+                <a:solidFill>
+                  <a:srgbClr val="FFFFFF"/>
+                </a:solidFill>
+              </a14:hiddenFill>
+            </a:ext>
+          </a:extLst>
+        </p:spPr>
+        <p:txBody>
+          <a:bodyPr vert="horz" wrap="square" lIns="91440" tIns="45720" rIns="91440" bIns="45720" numCol="1" anchor="t" anchorCtr="0" compatLnSpc="1">
+            <a:prstTxWarp prst="textNoShape">
+              <a:avLst/>
+            </a:prstTxWarp>
+          </a:bodyPr>
+          <a:lstStyle/>
+          <a:p>
+            <a:endParaRPr lang="da-DK"/>
+          </a:p>
+        </p:txBody>
+      </p:sp>
+      <p:pic>
+        <p:nvPicPr>
+          <p:cNvPr id="6" name="Billede 5"/>
+          <p:cNvPicPr>
+            <a:picLocks noChangeAspect="1"/>
+          </p:cNvPicPr>
+          <p:nvPr/>
+        </p:nvPicPr>
+        <p:blipFill>
+          <a:blip r:embed="rId2"/>
+          <a:stretch>
+            <a:fillRect/>
+          </a:stretch>
+        </p:blipFill>
+        <p:spPr>
+          <a:xfrm>
+            <a:off x="8381228" y="1186377"/>
+            <a:ext cx="3028950" cy="3990975"/>
+          </a:xfrm>
+          <a:prstGeom prst="rect">
+            <a:avLst/>
+          </a:prstGeom>
+        </p:spPr>
+      </p:pic>
+    </p:spTree>
+    <p:extLst>
+      <p:ext uri="{BB962C8B-B14F-4D97-AF65-F5344CB8AC3E}">
+        <p14:creationId xmlns:p14="http://schemas.microsoft.com/office/powerpoint/2010/main" val="2901843703"/>
+      </p:ext>
+    </p:extLst>
+  </p:cSld>
+  <p:clrMapOvr>
+    <a:masterClrMapping/>
+  </p:clrMapOvr>
+  <p:timing>
+    <p:tnLst>
+      <p:par>
+        <p:cTn id="1" dur="indefinite" restart="never" nodeType="tmRoot"/>
+      </p:par>
+    </p:tnLst>
+  </p:timing>
+</p:sld>
+</file>
+
+<file path=ppt/slides/slide15.xml><?xml version="1.0" encoding="utf-8"?>
+<p:sld xmlns:a="http://schemas.openxmlformats.org/drawingml/2006/main" xmlns:r="http://schemas.openxmlformats.org/officeDocument/2006/relationships" xmlns:p="http://schemas.openxmlformats.org/presentationml/2006/main">
+  <p:cSld>
+    <p:spTree>
+      <p:nvGrpSpPr>
+        <p:cNvPr id="1" name=""/>
+        <p:cNvGrpSpPr/>
+        <p:nvPr/>
+      </p:nvGrpSpPr>
+      <p:grpSpPr>
+        <a:xfrm>
+          <a:off x="0" y="0"/>
+          <a:ext cx="0" cy="0"/>
+          <a:chOff x="0" y="0"/>
+          <a:chExt cx="0" cy="0"/>
+        </a:xfrm>
+      </p:grpSpPr>
+      <p:sp>
+        <p:nvSpPr>
+          <p:cNvPr id="2" name="Titel 1"/>
+          <p:cNvSpPr>
+            <a:spLocks noGrp="1"/>
+          </p:cNvSpPr>
+          <p:nvPr>
+            <p:ph type="title"/>
+          </p:nvPr>
+        </p:nvSpPr>
+        <p:spPr/>
+        <p:txBody>
+          <a:bodyPr/>
+          <a:lstStyle/>
+          <a:p>
+            <a:r>
+              <a:rPr lang="da-DK" b="1" smtClean="0"/>
+              <a:t>HTML5</a:t>
+            </a:r>
+            <a:endParaRPr lang="da-DK"/>
+          </a:p>
+        </p:txBody>
+      </p:sp>
+      <p:sp>
+        <p:nvSpPr>
+          <p:cNvPr id="3" name="Pladsholder til indhold 2"/>
+          <p:cNvSpPr>
+            <a:spLocks noGrp="1"/>
+          </p:cNvSpPr>
+          <p:nvPr>
+            <p:ph idx="1"/>
+          </p:nvPr>
+        </p:nvSpPr>
+        <p:spPr>
+          <a:xfrm>
+            <a:off x="838200" y="1825625"/>
+            <a:ext cx="5599670" cy="4351338"/>
+          </a:xfrm>
+        </p:spPr>
+        <p:txBody>
+          <a:bodyPr>
+            <a:normAutofit/>
+          </a:bodyPr>
+          <a:lstStyle/>
+          <a:p>
+            <a:r>
+              <a:rPr lang="da-DK" smtClean="0"/>
+              <a:t>A number of layout-oriented </a:t>
+            </a:r>
+            <a:r>
+              <a:rPr lang="da-DK" b="1" smtClean="0"/>
+              <a:t>HTML</a:t>
+            </a:r>
+            <a:r>
+              <a:rPr lang="da-DK" smtClean="0"/>
+              <a:t> tags have also been declared as </a:t>
+            </a:r>
+            <a:r>
+              <a:rPr lang="da-DK" u="sng" smtClean="0"/>
+              <a:t>deprecated</a:t>
+            </a:r>
+            <a:r>
+              <a:rPr lang="da-DK" smtClean="0"/>
+              <a:t> in </a:t>
+            </a:r>
+            <a:r>
+              <a:rPr lang="da-DK" b="1" smtClean="0"/>
+              <a:t>HTML5</a:t>
+            </a:r>
+            <a:r>
+              <a:rPr lang="da-DK" smtClean="0"/>
+              <a:t>, like:</a:t>
+            </a:r>
+          </a:p>
+          <a:p>
+            <a:pPr lvl="1"/>
+            <a:r>
+              <a:rPr lang="da-DK" smtClean="0"/>
+              <a:t>&lt;font&gt;</a:t>
+            </a:r>
+          </a:p>
+          <a:p>
+            <a:pPr lvl="1"/>
+            <a:r>
+              <a:rPr lang="da-DK" smtClean="0"/>
+              <a:t>&lt;big&gt;</a:t>
+            </a:r>
+          </a:p>
+          <a:p>
+            <a:pPr lvl="1"/>
+            <a:r>
+              <a:rPr lang="da-DK" smtClean="0"/>
+              <a:t>&lt;u&gt;</a:t>
+            </a:r>
+          </a:p>
+          <a:p>
+            <a:pPr lvl="1"/>
+            <a:r>
+              <a:rPr lang="da-DK" smtClean="0"/>
+              <a:t>&lt;center&gt;</a:t>
+            </a:r>
+          </a:p>
+          <a:p>
+            <a:r>
+              <a:rPr lang="da-DK"/>
+              <a:t>Need more info? -&gt; </a:t>
+            </a:r>
+            <a:r>
+              <a:rPr lang="da-DK">
+                <a:hlinkClick r:id="rId2"/>
+              </a:rPr>
+              <a:t>https://</a:t>
+            </a:r>
+            <a:r>
+              <a:rPr lang="da-DK" smtClean="0">
+                <a:hlinkClick r:id="rId2"/>
+              </a:rPr>
+              <a:t>www.w3schools.com/html/html5_intro.asp</a:t>
+            </a:r>
+            <a:r>
+              <a:rPr lang="da-DK" smtClean="0"/>
+              <a:t> </a:t>
+            </a:r>
+            <a:endParaRPr lang="da-DK"/>
+          </a:p>
+          <a:p>
+            <a:pPr lvl="1"/>
+            <a:endParaRPr lang="da-DK" smtClean="0"/>
+          </a:p>
+        </p:txBody>
+      </p:sp>
+      <p:sp>
+        <p:nvSpPr>
+          <p:cNvPr id="4" name="AutoShape 2" descr="Billedresultat for html 5 logo"/>
+          <p:cNvSpPr>
+            <a:spLocks noChangeAspect="1" noChangeArrowheads="1"/>
+          </p:cNvSpPr>
+          <p:nvPr/>
+        </p:nvSpPr>
+        <p:spPr bwMode="auto">
+          <a:xfrm>
+            <a:off x="155575" y="-144463"/>
+            <a:ext cx="304800" cy="304801"/>
+          </a:xfrm>
+          <a:prstGeom prst="rect">
+            <a:avLst/>
+          </a:prstGeom>
+          <a:noFill/>
+          <a:extLst>
+            <a:ext uri="{909E8E84-426E-40DD-AFC4-6F175D3DCCD1}">
+              <a14:hiddenFill xmlns:a14="http://schemas.microsoft.com/office/drawing/2010/main">
+                <a:solidFill>
+                  <a:srgbClr val="FFFFFF"/>
+                </a:solidFill>
+              </a14:hiddenFill>
+            </a:ext>
+          </a:extLst>
+        </p:spPr>
+        <p:txBody>
+          <a:bodyPr vert="horz" wrap="square" lIns="91440" tIns="45720" rIns="91440" bIns="45720" numCol="1" anchor="t" anchorCtr="0" compatLnSpc="1">
+            <a:prstTxWarp prst="textNoShape">
+              <a:avLst/>
+            </a:prstTxWarp>
+          </a:bodyPr>
+          <a:lstStyle/>
+          <a:p>
+            <a:endParaRPr lang="da-DK"/>
+          </a:p>
+        </p:txBody>
+      </p:sp>
+      <p:sp>
+        <p:nvSpPr>
+          <p:cNvPr id="5" name="AutoShape 4" descr="Billedresultat for html 5 logo"/>
+          <p:cNvSpPr>
+            <a:spLocks noChangeAspect="1" noChangeArrowheads="1"/>
+          </p:cNvSpPr>
+          <p:nvPr/>
+        </p:nvSpPr>
+        <p:spPr bwMode="auto">
+          <a:xfrm>
+            <a:off x="307975" y="7937"/>
+            <a:ext cx="304800" cy="304801"/>
+          </a:xfrm>
+          <a:prstGeom prst="rect">
+            <a:avLst/>
+          </a:prstGeom>
+          <a:noFill/>
+          <a:extLst>
+            <a:ext uri="{909E8E84-426E-40DD-AFC4-6F175D3DCCD1}">
+              <a14:hiddenFill xmlns:a14="http://schemas.microsoft.com/office/drawing/2010/main">
+                <a:solidFill>
+                  <a:srgbClr val="FFFFFF"/>
+                </a:solidFill>
+              </a14:hiddenFill>
+            </a:ext>
+          </a:extLst>
+        </p:spPr>
+        <p:txBody>
+          <a:bodyPr vert="horz" wrap="square" lIns="91440" tIns="45720" rIns="91440" bIns="45720" numCol="1" anchor="t" anchorCtr="0" compatLnSpc="1">
+            <a:prstTxWarp prst="textNoShape">
+              <a:avLst/>
+            </a:prstTxWarp>
+          </a:bodyPr>
+          <a:lstStyle/>
+          <a:p>
+            <a:endParaRPr lang="da-DK"/>
+          </a:p>
+        </p:txBody>
+      </p:sp>
+      <p:pic>
+        <p:nvPicPr>
+          <p:cNvPr id="6" name="Billede 5"/>
+          <p:cNvPicPr>
+            <a:picLocks noChangeAspect="1"/>
+          </p:cNvPicPr>
+          <p:nvPr/>
+        </p:nvPicPr>
+        <p:blipFill>
+          <a:blip r:embed="rId3"/>
+          <a:stretch>
+            <a:fillRect/>
+          </a:stretch>
+        </p:blipFill>
+        <p:spPr>
+          <a:xfrm>
+            <a:off x="8381228" y="1186377"/>
+            <a:ext cx="3028950" cy="3990975"/>
+          </a:xfrm>
+          <a:prstGeom prst="rect">
+            <a:avLst/>
+          </a:prstGeom>
+        </p:spPr>
+      </p:pic>
+    </p:spTree>
+    <p:extLst>
+      <p:ext uri="{BB962C8B-B14F-4D97-AF65-F5344CB8AC3E}">
+        <p14:creationId xmlns:p14="http://schemas.microsoft.com/office/powerpoint/2010/main" val="3816729098"/>
+      </p:ext>
+    </p:extLst>
+  </p:cSld>
+  <p:clrMapOvr>
+    <a:masterClrMapping/>
+  </p:clrMapOvr>
+  <p:timing>
+    <p:tnLst>
+      <p:par>
+        <p:cTn id="1" dur="indefinite" restart="never" nodeType="tmRoot"/>
+      </p:par>
+    </p:tnLst>
+  </p:timing>
+</p:sld>
+</file>
+
+<file path=ppt/slides/slide16.xml><?xml version="1.0" encoding="utf-8"?>
+<p:sld xmlns:a="http://schemas.openxmlformats.org/drawingml/2006/main" xmlns:r="http://schemas.openxmlformats.org/officeDocument/2006/relationships" xmlns:p="http://schemas.openxmlformats.org/presentationml/2006/main">
+  <p:cSld>
+    <p:spTree>
+      <p:nvGrpSpPr>
+        <p:cNvPr id="1" name=""/>
+        <p:cNvGrpSpPr/>
+        <p:nvPr/>
+      </p:nvGrpSpPr>
+      <p:grpSpPr>
+        <a:xfrm>
+          <a:off x="0" y="0"/>
+          <a:ext cx="0" cy="0"/>
+          <a:chOff x="0" y="0"/>
+          <a:chExt cx="0" cy="0"/>
+        </a:xfrm>
+      </p:grpSpPr>
+      <p:sp>
+        <p:nvSpPr>
+          <p:cNvPr id="2" name="Titel 1"/>
+          <p:cNvSpPr>
+            <a:spLocks noGrp="1"/>
+          </p:cNvSpPr>
+          <p:nvPr>
+            <p:ph type="title"/>
+          </p:nvPr>
+        </p:nvSpPr>
+        <p:spPr/>
+        <p:txBody>
+          <a:bodyPr/>
+          <a:lstStyle/>
+          <a:p>
+            <a:r>
+              <a:rPr lang="da-DK" b="1" smtClean="0"/>
+              <a:t>Example: HTML5SemanticTags</a:t>
+            </a:r>
+            <a:endParaRPr lang="da-DK" b="1"/>
+          </a:p>
+        </p:txBody>
+      </p:sp>
+      <p:sp>
+        <p:nvSpPr>
+          <p:cNvPr id="3" name="Pladsholder til indhold 2"/>
+          <p:cNvSpPr>
+            <a:spLocks noGrp="1"/>
+          </p:cNvSpPr>
+          <p:nvPr>
+            <p:ph idx="1"/>
+          </p:nvPr>
+        </p:nvSpPr>
+        <p:spPr/>
+        <p:txBody>
+          <a:bodyPr/>
+          <a:lstStyle/>
+          <a:p>
+            <a:pPr marL="0" indent="0">
+              <a:buNone/>
+            </a:pPr>
+            <a:endParaRPr lang="da-DK"/>
+          </a:p>
+        </p:txBody>
+      </p:sp>
+    </p:spTree>
+    <p:extLst>
+      <p:ext uri="{BB962C8B-B14F-4D97-AF65-F5344CB8AC3E}">
+        <p14:creationId xmlns:p14="http://schemas.microsoft.com/office/powerpoint/2010/main" val="995448951"/>
+      </p:ext>
+    </p:extLst>
+  </p:cSld>
+  <p:clrMapOvr>
+    <a:masterClrMapping/>
+  </p:clrMapOvr>
+  <p:timing>
+    <p:tnLst>
+      <p:par>
+        <p:cTn id="1" dur="indefinite" restart="never" nodeType="tmRoot"/>
+      </p:par>
+    </p:tnLst>
+  </p:timing>
+</p:sld>
+</file>
+
+<file path=ppt/slides/slide17.xml><?xml version="1.0" encoding="utf-8"?>
+<p:sld xmlns:a="http://schemas.openxmlformats.org/drawingml/2006/main" xmlns:r="http://schemas.openxmlformats.org/officeDocument/2006/relationships" xmlns:p="http://schemas.openxmlformats.org/presentationml/2006/main">
+  <p:cSld>
+    <p:spTree>
+      <p:nvGrpSpPr>
+        <p:cNvPr id="1" name=""/>
+        <p:cNvGrpSpPr/>
+        <p:nvPr/>
+      </p:nvGrpSpPr>
+      <p:grpSpPr>
+        <a:xfrm>
+          <a:off x="0" y="0"/>
+          <a:ext cx="0" cy="0"/>
+          <a:chOff x="0" y="0"/>
+          <a:chExt cx="0" cy="0"/>
+        </a:xfrm>
+      </p:grpSpPr>
+      <p:sp>
+        <p:nvSpPr>
           <p:cNvPr id="2" name="Titel 1"/>
           <p:cNvSpPr>
             <a:spLocks noGrp="1"/>
@@ -3557,11 +4603,7 @@
           <a:p>
             <a:r>
               <a:rPr lang="da-DK"/>
-              <a:t>Need </a:t>
-            </a:r>
-            <a:r>
-              <a:rPr lang="da-DK"/>
-              <a:t>more </a:t>
+              <a:t>Need more </a:t>
             </a:r>
             <a:r>
               <a:rPr lang="da-DK" smtClean="0"/>
@@ -3571,13 +4613,7 @@
               <a:rPr lang="da-DK">
                 <a:hlinkClick r:id="rId2"/>
               </a:rPr>
-              <a:t>https</a:t>
-            </a:r>
-            <a:r>
-              <a:rPr lang="da-DK">
-                <a:hlinkClick r:id="rId2"/>
-              </a:rPr>
-              <a:t>://</a:t>
+              <a:t>https://</a:t>
             </a:r>
             <a:r>
               <a:rPr lang="da-DK" smtClean="0">
@@ -3637,1070 +4673,6 @@
 </p:sld>
 </file>
 
-<file path=ppt/slides/slide13.xml><?xml version="1.0" encoding="utf-8"?>
-<p:sld xmlns:a="http://schemas.openxmlformats.org/drawingml/2006/main" xmlns:r="http://schemas.openxmlformats.org/officeDocument/2006/relationships" xmlns:p="http://schemas.openxmlformats.org/presentationml/2006/main">
-  <p:cSld>
-    <p:spTree>
-      <p:nvGrpSpPr>
-        <p:cNvPr id="1" name=""/>
-        <p:cNvGrpSpPr/>
-        <p:nvPr/>
-      </p:nvGrpSpPr>
-      <p:grpSpPr>
-        <a:xfrm>
-          <a:off x="0" y="0"/>
-          <a:ext cx="0" cy="0"/>
-          <a:chOff x="0" y="0"/>
-          <a:chExt cx="0" cy="0"/>
-        </a:xfrm>
-      </p:grpSpPr>
-      <p:sp>
-        <p:nvSpPr>
-          <p:cNvPr id="2" name="Titel 1"/>
-          <p:cNvSpPr>
-            <a:spLocks noGrp="1"/>
-          </p:cNvSpPr>
-          <p:nvPr>
-            <p:ph type="title"/>
-          </p:nvPr>
-        </p:nvSpPr>
-        <p:spPr/>
-        <p:txBody>
-          <a:bodyPr/>
-          <a:lstStyle/>
-          <a:p>
-            <a:r>
-              <a:rPr lang="da-DK" b="1" smtClean="0"/>
-              <a:t>Example: RoundedCornerShadows</a:t>
-            </a:r>
-            <a:endParaRPr lang="da-DK" b="1"/>
-          </a:p>
-        </p:txBody>
-      </p:sp>
-      <p:sp>
-        <p:nvSpPr>
-          <p:cNvPr id="3" name="Pladsholder til indhold 2"/>
-          <p:cNvSpPr>
-            <a:spLocks noGrp="1"/>
-          </p:cNvSpPr>
-          <p:nvPr>
-            <p:ph idx="1"/>
-          </p:nvPr>
-        </p:nvSpPr>
-        <p:spPr/>
-        <p:txBody>
-          <a:bodyPr/>
-          <a:lstStyle/>
-          <a:p>
-            <a:r>
-              <a:rPr lang="da-DK" smtClean="0"/>
-              <a:t>NB: Drop –webkit prefix in CSS.</a:t>
-            </a:r>
-            <a:endParaRPr lang="da-DK"/>
-          </a:p>
-        </p:txBody>
-      </p:sp>
-    </p:spTree>
-    <p:extLst>
-      <p:ext uri="{BB962C8B-B14F-4D97-AF65-F5344CB8AC3E}">
-        <p14:creationId xmlns:p14="http://schemas.microsoft.com/office/powerpoint/2010/main" val="3695911945"/>
-      </p:ext>
-    </p:extLst>
-  </p:cSld>
-  <p:clrMapOvr>
-    <a:masterClrMapping/>
-  </p:clrMapOvr>
-  <p:timing>
-    <p:tnLst>
-      <p:par>
-        <p:cTn id="1" dur="indefinite" restart="never" nodeType="tmRoot"/>
-      </p:par>
-    </p:tnLst>
-  </p:timing>
-</p:sld>
-</file>
-
-<file path=ppt/slides/slide14.xml><?xml version="1.0" encoding="utf-8"?>
-<p:sld xmlns:a="http://schemas.openxmlformats.org/drawingml/2006/main" xmlns:r="http://schemas.openxmlformats.org/officeDocument/2006/relationships" xmlns:p="http://schemas.openxmlformats.org/presentationml/2006/main">
-  <p:cSld>
-    <p:spTree>
-      <p:nvGrpSpPr>
-        <p:cNvPr id="1" name=""/>
-        <p:cNvGrpSpPr/>
-        <p:nvPr/>
-      </p:nvGrpSpPr>
-      <p:grpSpPr>
-        <a:xfrm>
-          <a:off x="0" y="0"/>
-          <a:ext cx="0" cy="0"/>
-          <a:chOff x="0" y="0"/>
-          <a:chExt cx="0" cy="0"/>
-        </a:xfrm>
-      </p:grpSpPr>
-      <p:sp>
-        <p:nvSpPr>
-          <p:cNvPr id="4" name="Ellipse 3"/>
-          <p:cNvSpPr/>
-          <p:nvPr/>
-        </p:nvSpPr>
-        <p:spPr>
-          <a:xfrm>
-            <a:off x="4010256" y="1627269"/>
-            <a:ext cx="3600000" cy="3600000"/>
-          </a:xfrm>
-          <a:prstGeom prst="ellipse">
-            <a:avLst/>
-          </a:prstGeom>
-        </p:spPr>
-        <p:style>
-          <a:lnRef idx="2">
-            <a:schemeClr val="accent1">
-              <a:shade val="50000"/>
-            </a:schemeClr>
-          </a:lnRef>
-          <a:fillRef idx="1">
-            <a:schemeClr val="accent1"/>
-          </a:fillRef>
-          <a:effectRef idx="0">
-            <a:schemeClr val="accent1"/>
-          </a:effectRef>
-          <a:fontRef idx="minor">
-            <a:schemeClr val="lt1"/>
-          </a:fontRef>
-        </p:style>
-        <p:txBody>
-          <a:bodyPr rtlCol="0" anchor="ctr"/>
-          <a:lstStyle/>
-          <a:p>
-            <a:pPr algn="ctr"/>
-            <a:r>
-              <a:rPr lang="da-DK" sz="4800" smtClean="0"/>
-              <a:t>DOM</a:t>
-            </a:r>
-            <a:endParaRPr lang="da-DK" sz="4800"/>
-          </a:p>
-        </p:txBody>
-      </p:sp>
-      <p:sp>
-        <p:nvSpPr>
-          <p:cNvPr id="5" name="Rektangel 4"/>
-          <p:cNvSpPr/>
-          <p:nvPr/>
-        </p:nvSpPr>
-        <p:spPr>
-          <a:xfrm>
-            <a:off x="2351206" y="660242"/>
-            <a:ext cx="2160000" cy="2160000"/>
-          </a:xfrm>
-          <a:prstGeom prst="rect">
-            <a:avLst/>
-          </a:prstGeom>
-          <a:solidFill>
-            <a:schemeClr val="accent6">
-              <a:lumMod val="75000"/>
-            </a:schemeClr>
-          </a:solidFill>
-        </p:spPr>
-        <p:style>
-          <a:lnRef idx="2">
-            <a:schemeClr val="accent1">
-              <a:shade val="50000"/>
-            </a:schemeClr>
-          </a:lnRef>
-          <a:fillRef idx="1">
-            <a:schemeClr val="accent1"/>
-          </a:fillRef>
-          <a:effectRef idx="0">
-            <a:schemeClr val="accent1"/>
-          </a:effectRef>
-          <a:fontRef idx="minor">
-            <a:schemeClr val="lt1"/>
-          </a:fontRef>
-        </p:style>
-        <p:txBody>
-          <a:bodyPr rtlCol="0" anchor="t"/>
-          <a:lstStyle/>
-          <a:p>
-            <a:pPr algn="ctr"/>
-            <a:r>
-              <a:rPr lang="da-DK" sz="3200" smtClean="0">
-                <a:solidFill>
-                  <a:srgbClr val="FFFF00"/>
-                </a:solidFill>
-              </a:rPr>
-              <a:t>HTML</a:t>
-            </a:r>
-          </a:p>
-          <a:p>
-            <a:pPr algn="ctr"/>
-            <a:r>
-              <a:rPr lang="da-DK" sz="2000" smtClean="0">
-                <a:solidFill>
-                  <a:schemeClr val="bg1"/>
-                </a:solidFill>
-              </a:rPr>
-              <a:t>(structure)</a:t>
-            </a:r>
-          </a:p>
-          <a:p>
-            <a:pPr algn="ctr"/>
-            <a:r>
-              <a:rPr lang="da-DK" sz="2000" smtClean="0">
-                <a:solidFill>
-                  <a:schemeClr val="bg1">
-                    <a:lumMod val="65000"/>
-                  </a:schemeClr>
-                </a:solidFill>
-              </a:rPr>
-              <a:t>(layout)</a:t>
-            </a:r>
-          </a:p>
-          <a:p>
-            <a:pPr algn="ctr"/>
-            <a:r>
-              <a:rPr lang="da-DK" sz="2000" smtClean="0">
-                <a:solidFill>
-                  <a:schemeClr val="bg1"/>
-                </a:solidFill>
-              </a:rPr>
-              <a:t>(interactivity)</a:t>
-            </a:r>
-            <a:endParaRPr lang="da-DK" sz="2000">
-              <a:solidFill>
-                <a:schemeClr val="bg1"/>
-              </a:solidFill>
-            </a:endParaRPr>
-          </a:p>
-        </p:txBody>
-      </p:sp>
-      <p:sp>
-        <p:nvSpPr>
-          <p:cNvPr id="6" name="Rektangel 5"/>
-          <p:cNvSpPr/>
-          <p:nvPr/>
-        </p:nvSpPr>
-        <p:spPr>
-          <a:xfrm>
-            <a:off x="7085081" y="660242"/>
-            <a:ext cx="2160000" cy="2160000"/>
-          </a:xfrm>
-          <a:prstGeom prst="rect">
-            <a:avLst/>
-          </a:prstGeom>
-          <a:solidFill>
-            <a:srgbClr val="C00000"/>
-          </a:solidFill>
-        </p:spPr>
-        <p:style>
-          <a:lnRef idx="2">
-            <a:schemeClr val="accent1">
-              <a:shade val="50000"/>
-            </a:schemeClr>
-          </a:lnRef>
-          <a:fillRef idx="1">
-            <a:schemeClr val="accent1"/>
-          </a:fillRef>
-          <a:effectRef idx="0">
-            <a:schemeClr val="accent1"/>
-          </a:effectRef>
-          <a:fontRef idx="minor">
-            <a:schemeClr val="lt1"/>
-          </a:fontRef>
-        </p:style>
-        <p:txBody>
-          <a:bodyPr rtlCol="0" anchor="t"/>
-          <a:lstStyle/>
-          <a:p>
-            <a:pPr algn="ctr"/>
-            <a:r>
-              <a:rPr lang="da-DK" sz="3200" smtClean="0">
-                <a:solidFill>
-                  <a:srgbClr val="FFFF00"/>
-                </a:solidFill>
-              </a:rPr>
-              <a:t>CSS</a:t>
-            </a:r>
-          </a:p>
-          <a:p>
-            <a:pPr algn="ctr"/>
-            <a:r>
-              <a:rPr lang="da-DK" sz="2000" smtClean="0">
-                <a:solidFill>
-                  <a:schemeClr val="bg1"/>
-                </a:solidFill>
-              </a:rPr>
-              <a:t>(layout)</a:t>
-            </a:r>
-          </a:p>
-        </p:txBody>
-      </p:sp>
-    </p:spTree>
-    <p:extLst>
-      <p:ext uri="{BB962C8B-B14F-4D97-AF65-F5344CB8AC3E}">
-        <p14:creationId xmlns:p14="http://schemas.microsoft.com/office/powerpoint/2010/main" val="3375027990"/>
-      </p:ext>
-    </p:extLst>
-  </p:cSld>
-  <p:clrMapOvr>
-    <a:masterClrMapping/>
-  </p:clrMapOvr>
-  <p:timing>
-    <p:tnLst>
-      <p:par>
-        <p:cTn id="1" dur="indefinite" restart="never" nodeType="tmRoot"/>
-      </p:par>
-    </p:tnLst>
-  </p:timing>
-</p:sld>
-</file>
-
-<file path=ppt/slides/slide15.xml><?xml version="1.0" encoding="utf-8"?>
-<p:sld xmlns:a="http://schemas.openxmlformats.org/drawingml/2006/main" xmlns:r="http://schemas.openxmlformats.org/officeDocument/2006/relationships" xmlns:p="http://schemas.openxmlformats.org/presentationml/2006/main">
-  <p:cSld>
-    <p:spTree>
-      <p:nvGrpSpPr>
-        <p:cNvPr id="1" name=""/>
-        <p:cNvGrpSpPr/>
-        <p:nvPr/>
-      </p:nvGrpSpPr>
-      <p:grpSpPr>
-        <a:xfrm>
-          <a:off x="0" y="0"/>
-          <a:ext cx="0" cy="0"/>
-          <a:chOff x="0" y="0"/>
-          <a:chExt cx="0" cy="0"/>
-        </a:xfrm>
-      </p:grpSpPr>
-      <p:sp>
-        <p:nvSpPr>
-          <p:cNvPr id="2" name="Titel 1"/>
-          <p:cNvSpPr>
-            <a:spLocks noGrp="1"/>
-          </p:cNvSpPr>
-          <p:nvPr>
-            <p:ph type="title"/>
-          </p:nvPr>
-        </p:nvSpPr>
-        <p:spPr/>
-        <p:txBody>
-          <a:bodyPr/>
-          <a:lstStyle/>
-          <a:p>
-            <a:r>
-              <a:rPr lang="da-DK" b="1" smtClean="0"/>
-              <a:t>HTML5</a:t>
-            </a:r>
-            <a:endParaRPr lang="da-DK"/>
-          </a:p>
-        </p:txBody>
-      </p:sp>
-      <p:sp>
-        <p:nvSpPr>
-          <p:cNvPr id="3" name="Pladsholder til indhold 2"/>
-          <p:cNvSpPr>
-            <a:spLocks noGrp="1"/>
-          </p:cNvSpPr>
-          <p:nvPr>
-            <p:ph idx="1"/>
-          </p:nvPr>
-        </p:nvSpPr>
-        <p:spPr>
-          <a:xfrm>
-            <a:off x="838200" y="1825625"/>
-            <a:ext cx="5062151" cy="4351338"/>
-          </a:xfrm>
-        </p:spPr>
-        <p:txBody>
-          <a:bodyPr>
-            <a:normAutofit/>
-          </a:bodyPr>
-          <a:lstStyle/>
-          <a:p>
-            <a:r>
-              <a:rPr lang="da-DK" smtClean="0"/>
-              <a:t>Ideally, </a:t>
-            </a:r>
-            <a:r>
-              <a:rPr lang="da-DK" b="1" smtClean="0"/>
-              <a:t>HTML</a:t>
-            </a:r>
-            <a:r>
-              <a:rPr lang="da-DK" smtClean="0"/>
-              <a:t> should </a:t>
-            </a:r>
-            <a:r>
-              <a:rPr lang="da-DK" u="sng" smtClean="0"/>
-              <a:t>not</a:t>
-            </a:r>
-            <a:r>
-              <a:rPr lang="da-DK" smtClean="0"/>
-              <a:t> in any way define the presentation of a web page</a:t>
-            </a:r>
-          </a:p>
-          <a:p>
-            <a:r>
-              <a:rPr lang="da-DK" smtClean="0"/>
-              <a:t>Ideally, tags like &lt;b&gt;, &lt;br&gt; and &lt;font&gt; should </a:t>
-            </a:r>
-            <a:r>
-              <a:rPr lang="da-DK" u="sng" smtClean="0"/>
-              <a:t>not</a:t>
-            </a:r>
-            <a:r>
-              <a:rPr lang="da-DK" smtClean="0"/>
-              <a:t> be part of </a:t>
-            </a:r>
-            <a:r>
-              <a:rPr lang="da-DK" b="1" smtClean="0"/>
-              <a:t>HTML</a:t>
-            </a:r>
-          </a:p>
-          <a:p>
-            <a:r>
-              <a:rPr lang="da-DK" smtClean="0"/>
-              <a:t>Enter </a:t>
-            </a:r>
-            <a:r>
-              <a:rPr lang="da-DK" b="1" smtClean="0"/>
-              <a:t>HTML5</a:t>
-            </a:r>
-            <a:r>
-              <a:rPr lang="da-DK" smtClean="0"/>
-              <a:t>…</a:t>
-            </a:r>
-          </a:p>
-        </p:txBody>
-      </p:sp>
-      <p:sp>
-        <p:nvSpPr>
-          <p:cNvPr id="4" name="AutoShape 2" descr="Billedresultat for html 5 logo"/>
-          <p:cNvSpPr>
-            <a:spLocks noChangeAspect="1" noChangeArrowheads="1"/>
-          </p:cNvSpPr>
-          <p:nvPr/>
-        </p:nvSpPr>
-        <p:spPr bwMode="auto">
-          <a:xfrm>
-            <a:off x="155575" y="-144463"/>
-            <a:ext cx="304800" cy="304801"/>
-          </a:xfrm>
-          <a:prstGeom prst="rect">
-            <a:avLst/>
-          </a:prstGeom>
-          <a:noFill/>
-          <a:extLst>
-            <a:ext uri="{909E8E84-426E-40DD-AFC4-6F175D3DCCD1}">
-              <a14:hiddenFill xmlns:a14="http://schemas.microsoft.com/office/drawing/2010/main">
-                <a:solidFill>
-                  <a:srgbClr val="FFFFFF"/>
-                </a:solidFill>
-              </a14:hiddenFill>
-            </a:ext>
-          </a:extLst>
-        </p:spPr>
-        <p:txBody>
-          <a:bodyPr vert="horz" wrap="square" lIns="91440" tIns="45720" rIns="91440" bIns="45720" numCol="1" anchor="t" anchorCtr="0" compatLnSpc="1">
-            <a:prstTxWarp prst="textNoShape">
-              <a:avLst/>
-            </a:prstTxWarp>
-          </a:bodyPr>
-          <a:lstStyle/>
-          <a:p>
-            <a:endParaRPr lang="da-DK"/>
-          </a:p>
-        </p:txBody>
-      </p:sp>
-      <p:sp>
-        <p:nvSpPr>
-          <p:cNvPr id="5" name="AutoShape 4" descr="Billedresultat for html 5 logo"/>
-          <p:cNvSpPr>
-            <a:spLocks noChangeAspect="1" noChangeArrowheads="1"/>
-          </p:cNvSpPr>
-          <p:nvPr/>
-        </p:nvSpPr>
-        <p:spPr bwMode="auto">
-          <a:xfrm>
-            <a:off x="307975" y="7937"/>
-            <a:ext cx="304800" cy="304801"/>
-          </a:xfrm>
-          <a:prstGeom prst="rect">
-            <a:avLst/>
-          </a:prstGeom>
-          <a:noFill/>
-          <a:extLst>
-            <a:ext uri="{909E8E84-426E-40DD-AFC4-6F175D3DCCD1}">
-              <a14:hiddenFill xmlns:a14="http://schemas.microsoft.com/office/drawing/2010/main">
-                <a:solidFill>
-                  <a:srgbClr val="FFFFFF"/>
-                </a:solidFill>
-              </a14:hiddenFill>
-            </a:ext>
-          </a:extLst>
-        </p:spPr>
-        <p:txBody>
-          <a:bodyPr vert="horz" wrap="square" lIns="91440" tIns="45720" rIns="91440" bIns="45720" numCol="1" anchor="t" anchorCtr="0" compatLnSpc="1">
-            <a:prstTxWarp prst="textNoShape">
-              <a:avLst/>
-            </a:prstTxWarp>
-          </a:bodyPr>
-          <a:lstStyle/>
-          <a:p>
-            <a:endParaRPr lang="da-DK"/>
-          </a:p>
-        </p:txBody>
-      </p:sp>
-      <p:pic>
-        <p:nvPicPr>
-          <p:cNvPr id="6" name="Billede 5"/>
-          <p:cNvPicPr>
-            <a:picLocks noChangeAspect="1"/>
-          </p:cNvPicPr>
-          <p:nvPr/>
-        </p:nvPicPr>
-        <p:blipFill>
-          <a:blip r:embed="rId2"/>
-          <a:stretch>
-            <a:fillRect/>
-          </a:stretch>
-        </p:blipFill>
-        <p:spPr>
-          <a:xfrm>
-            <a:off x="8381228" y="1186377"/>
-            <a:ext cx="3028950" cy="3990975"/>
-          </a:xfrm>
-          <a:prstGeom prst="rect">
-            <a:avLst/>
-          </a:prstGeom>
-        </p:spPr>
-      </p:pic>
-    </p:spTree>
-    <p:extLst>
-      <p:ext uri="{BB962C8B-B14F-4D97-AF65-F5344CB8AC3E}">
-        <p14:creationId xmlns:p14="http://schemas.microsoft.com/office/powerpoint/2010/main" val="3545764893"/>
-      </p:ext>
-    </p:extLst>
-  </p:cSld>
-  <p:clrMapOvr>
-    <a:masterClrMapping/>
-  </p:clrMapOvr>
-  <p:timing>
-    <p:tnLst>
-      <p:par>
-        <p:cTn id="1" dur="indefinite" restart="never" nodeType="tmRoot"/>
-      </p:par>
-    </p:tnLst>
-  </p:timing>
-</p:sld>
-</file>
-
-<file path=ppt/slides/slide16.xml><?xml version="1.0" encoding="utf-8"?>
-<p:sld xmlns:a="http://schemas.openxmlformats.org/drawingml/2006/main" xmlns:r="http://schemas.openxmlformats.org/officeDocument/2006/relationships" xmlns:p="http://schemas.openxmlformats.org/presentationml/2006/main">
-  <p:cSld>
-    <p:spTree>
-      <p:nvGrpSpPr>
-        <p:cNvPr id="1" name=""/>
-        <p:cNvGrpSpPr/>
-        <p:nvPr/>
-      </p:nvGrpSpPr>
-      <p:grpSpPr>
-        <a:xfrm>
-          <a:off x="0" y="0"/>
-          <a:ext cx="0" cy="0"/>
-          <a:chOff x="0" y="0"/>
-          <a:chExt cx="0" cy="0"/>
-        </a:xfrm>
-      </p:grpSpPr>
-      <p:sp>
-        <p:nvSpPr>
-          <p:cNvPr id="2" name="Titel 1"/>
-          <p:cNvSpPr>
-            <a:spLocks noGrp="1"/>
-          </p:cNvSpPr>
-          <p:nvPr>
-            <p:ph type="title"/>
-          </p:nvPr>
-        </p:nvSpPr>
-        <p:spPr/>
-        <p:txBody>
-          <a:bodyPr/>
-          <a:lstStyle/>
-          <a:p>
-            <a:r>
-              <a:rPr lang="da-DK" b="1" smtClean="0"/>
-              <a:t>HTML5</a:t>
-            </a:r>
-            <a:endParaRPr lang="da-DK"/>
-          </a:p>
-        </p:txBody>
-      </p:sp>
-      <p:sp>
-        <p:nvSpPr>
-          <p:cNvPr id="3" name="Pladsholder til indhold 2"/>
-          <p:cNvSpPr>
-            <a:spLocks noGrp="1"/>
-          </p:cNvSpPr>
-          <p:nvPr>
-            <p:ph idx="1"/>
-          </p:nvPr>
-        </p:nvSpPr>
-        <p:spPr>
-          <a:xfrm>
-            <a:off x="838200" y="1825625"/>
-            <a:ext cx="6606746" cy="4351338"/>
-          </a:xfrm>
-        </p:spPr>
-        <p:txBody>
-          <a:bodyPr>
-            <a:normAutofit/>
-          </a:bodyPr>
-          <a:lstStyle/>
-          <a:p>
-            <a:r>
-              <a:rPr lang="da-DK" smtClean="0"/>
-              <a:t>Noteworthy new elements in HTML5:</a:t>
-            </a:r>
-          </a:p>
-          <a:p>
-            <a:pPr lvl="1"/>
-            <a:r>
-              <a:rPr lang="da-DK" b="1" smtClean="0"/>
-              <a:t>Semantic tags</a:t>
-            </a:r>
-            <a:r>
-              <a:rPr lang="da-DK" smtClean="0"/>
-              <a:t>: &lt;header&gt;, &lt;footer&gt;, &lt;article&gt;, &lt;section&gt;, &lt;summary&gt;, etc.. </a:t>
-            </a:r>
-          </a:p>
-          <a:p>
-            <a:pPr lvl="1"/>
-            <a:r>
-              <a:rPr lang="da-DK" b="1" smtClean="0"/>
-              <a:t>Graphics and Media tags</a:t>
-            </a:r>
-            <a:r>
-              <a:rPr lang="da-DK" smtClean="0"/>
-              <a:t>: &lt;canvas&gt;, &lt;svg&gt;, &lt;audio&gt;, &lt;video&gt;, etc..</a:t>
-            </a:r>
-          </a:p>
-          <a:p>
-            <a:pPr lvl="1"/>
-            <a:r>
-              <a:rPr lang="da-DK" b="1" smtClean="0"/>
-              <a:t>APIs</a:t>
-            </a:r>
-            <a:r>
-              <a:rPr lang="da-DK" smtClean="0"/>
-              <a:t>: Geolocation, Local Storage, Web Workers,…</a:t>
-            </a:r>
-          </a:p>
-        </p:txBody>
-      </p:sp>
-      <p:sp>
-        <p:nvSpPr>
-          <p:cNvPr id="4" name="AutoShape 2" descr="Billedresultat for html 5 logo"/>
-          <p:cNvSpPr>
-            <a:spLocks noChangeAspect="1" noChangeArrowheads="1"/>
-          </p:cNvSpPr>
-          <p:nvPr/>
-        </p:nvSpPr>
-        <p:spPr bwMode="auto">
-          <a:xfrm>
-            <a:off x="155575" y="-144463"/>
-            <a:ext cx="304800" cy="304801"/>
-          </a:xfrm>
-          <a:prstGeom prst="rect">
-            <a:avLst/>
-          </a:prstGeom>
-          <a:noFill/>
-          <a:extLst>
-            <a:ext uri="{909E8E84-426E-40DD-AFC4-6F175D3DCCD1}">
-              <a14:hiddenFill xmlns:a14="http://schemas.microsoft.com/office/drawing/2010/main">
-                <a:solidFill>
-                  <a:srgbClr val="FFFFFF"/>
-                </a:solidFill>
-              </a14:hiddenFill>
-            </a:ext>
-          </a:extLst>
-        </p:spPr>
-        <p:txBody>
-          <a:bodyPr vert="horz" wrap="square" lIns="91440" tIns="45720" rIns="91440" bIns="45720" numCol="1" anchor="t" anchorCtr="0" compatLnSpc="1">
-            <a:prstTxWarp prst="textNoShape">
-              <a:avLst/>
-            </a:prstTxWarp>
-          </a:bodyPr>
-          <a:lstStyle/>
-          <a:p>
-            <a:endParaRPr lang="da-DK"/>
-          </a:p>
-        </p:txBody>
-      </p:sp>
-      <p:sp>
-        <p:nvSpPr>
-          <p:cNvPr id="5" name="AutoShape 4" descr="Billedresultat for html 5 logo"/>
-          <p:cNvSpPr>
-            <a:spLocks noChangeAspect="1" noChangeArrowheads="1"/>
-          </p:cNvSpPr>
-          <p:nvPr/>
-        </p:nvSpPr>
-        <p:spPr bwMode="auto">
-          <a:xfrm>
-            <a:off x="307975" y="7937"/>
-            <a:ext cx="304800" cy="304801"/>
-          </a:xfrm>
-          <a:prstGeom prst="rect">
-            <a:avLst/>
-          </a:prstGeom>
-          <a:noFill/>
-          <a:extLst>
-            <a:ext uri="{909E8E84-426E-40DD-AFC4-6F175D3DCCD1}">
-              <a14:hiddenFill xmlns:a14="http://schemas.microsoft.com/office/drawing/2010/main">
-                <a:solidFill>
-                  <a:srgbClr val="FFFFFF"/>
-                </a:solidFill>
-              </a14:hiddenFill>
-            </a:ext>
-          </a:extLst>
-        </p:spPr>
-        <p:txBody>
-          <a:bodyPr vert="horz" wrap="square" lIns="91440" tIns="45720" rIns="91440" bIns="45720" numCol="1" anchor="t" anchorCtr="0" compatLnSpc="1">
-            <a:prstTxWarp prst="textNoShape">
-              <a:avLst/>
-            </a:prstTxWarp>
-          </a:bodyPr>
-          <a:lstStyle/>
-          <a:p>
-            <a:endParaRPr lang="da-DK"/>
-          </a:p>
-        </p:txBody>
-      </p:sp>
-      <p:pic>
-        <p:nvPicPr>
-          <p:cNvPr id="6" name="Billede 5"/>
-          <p:cNvPicPr>
-            <a:picLocks noChangeAspect="1"/>
-          </p:cNvPicPr>
-          <p:nvPr/>
-        </p:nvPicPr>
-        <p:blipFill>
-          <a:blip r:embed="rId2"/>
-          <a:stretch>
-            <a:fillRect/>
-          </a:stretch>
-        </p:blipFill>
-        <p:spPr>
-          <a:xfrm>
-            <a:off x="8381228" y="1186377"/>
-            <a:ext cx="3028950" cy="3990975"/>
-          </a:xfrm>
-          <a:prstGeom prst="rect">
-            <a:avLst/>
-          </a:prstGeom>
-        </p:spPr>
-      </p:pic>
-    </p:spTree>
-    <p:extLst>
-      <p:ext uri="{BB962C8B-B14F-4D97-AF65-F5344CB8AC3E}">
-        <p14:creationId xmlns:p14="http://schemas.microsoft.com/office/powerpoint/2010/main" val="2901843703"/>
-      </p:ext>
-    </p:extLst>
-  </p:cSld>
-  <p:clrMapOvr>
-    <a:masterClrMapping/>
-  </p:clrMapOvr>
-  <p:timing>
-    <p:tnLst>
-      <p:par>
-        <p:cTn id="1" dur="indefinite" restart="never" nodeType="tmRoot"/>
-      </p:par>
-    </p:tnLst>
-  </p:timing>
-</p:sld>
-</file>
-
-<file path=ppt/slides/slide17.xml><?xml version="1.0" encoding="utf-8"?>
-<p:sld xmlns:a="http://schemas.openxmlformats.org/drawingml/2006/main" xmlns:r="http://schemas.openxmlformats.org/officeDocument/2006/relationships" xmlns:p="http://schemas.openxmlformats.org/presentationml/2006/main">
-  <p:cSld>
-    <p:spTree>
-      <p:nvGrpSpPr>
-        <p:cNvPr id="1" name=""/>
-        <p:cNvGrpSpPr/>
-        <p:nvPr/>
-      </p:nvGrpSpPr>
-      <p:grpSpPr>
-        <a:xfrm>
-          <a:off x="0" y="0"/>
-          <a:ext cx="0" cy="0"/>
-          <a:chOff x="0" y="0"/>
-          <a:chExt cx="0" cy="0"/>
-        </a:xfrm>
-      </p:grpSpPr>
-      <p:sp>
-        <p:nvSpPr>
-          <p:cNvPr id="2" name="Titel 1"/>
-          <p:cNvSpPr>
-            <a:spLocks noGrp="1"/>
-          </p:cNvSpPr>
-          <p:nvPr>
-            <p:ph type="title"/>
-          </p:nvPr>
-        </p:nvSpPr>
-        <p:spPr/>
-        <p:txBody>
-          <a:bodyPr/>
-          <a:lstStyle/>
-          <a:p>
-            <a:r>
-              <a:rPr lang="da-DK" b="1" smtClean="0"/>
-              <a:t>HTML5</a:t>
-            </a:r>
-            <a:endParaRPr lang="da-DK"/>
-          </a:p>
-        </p:txBody>
-      </p:sp>
-      <p:sp>
-        <p:nvSpPr>
-          <p:cNvPr id="3" name="Pladsholder til indhold 2"/>
-          <p:cNvSpPr>
-            <a:spLocks noGrp="1"/>
-          </p:cNvSpPr>
-          <p:nvPr>
-            <p:ph idx="1"/>
-          </p:nvPr>
-        </p:nvSpPr>
-        <p:spPr>
-          <a:xfrm>
-            <a:off x="838200" y="1825625"/>
-            <a:ext cx="5599670" cy="4351338"/>
-          </a:xfrm>
-        </p:spPr>
-        <p:txBody>
-          <a:bodyPr>
-            <a:normAutofit/>
-          </a:bodyPr>
-          <a:lstStyle/>
-          <a:p>
-            <a:r>
-              <a:rPr lang="da-DK" smtClean="0"/>
-              <a:t>A number of layout-oriented </a:t>
-            </a:r>
-            <a:r>
-              <a:rPr lang="da-DK" b="1" smtClean="0"/>
-              <a:t>HTML</a:t>
-            </a:r>
-            <a:r>
-              <a:rPr lang="da-DK" smtClean="0"/>
-              <a:t> tags have also been declared as </a:t>
-            </a:r>
-            <a:r>
-              <a:rPr lang="da-DK" u="sng" smtClean="0"/>
-              <a:t>deprecated</a:t>
-            </a:r>
-            <a:r>
-              <a:rPr lang="da-DK" smtClean="0"/>
-              <a:t> in </a:t>
-            </a:r>
-            <a:r>
-              <a:rPr lang="da-DK" b="1" smtClean="0"/>
-              <a:t>HTML5</a:t>
-            </a:r>
-            <a:r>
-              <a:rPr lang="da-DK" smtClean="0"/>
-              <a:t>, like:</a:t>
-            </a:r>
-          </a:p>
-          <a:p>
-            <a:pPr lvl="1"/>
-            <a:r>
-              <a:rPr lang="da-DK" smtClean="0"/>
-              <a:t>&lt;font&gt;</a:t>
-            </a:r>
-          </a:p>
-          <a:p>
-            <a:pPr lvl="1"/>
-            <a:r>
-              <a:rPr lang="da-DK" smtClean="0"/>
-              <a:t>&lt;big&gt;</a:t>
-            </a:r>
-          </a:p>
-          <a:p>
-            <a:pPr lvl="1"/>
-            <a:r>
-              <a:rPr lang="da-DK" smtClean="0"/>
-              <a:t>&lt;u&gt;</a:t>
-            </a:r>
-          </a:p>
-          <a:p>
-            <a:pPr lvl="1"/>
-            <a:r>
-              <a:rPr lang="da-DK" smtClean="0"/>
-              <a:t>&lt;center&gt;</a:t>
-            </a:r>
-          </a:p>
-          <a:p>
-            <a:r>
-              <a:rPr lang="da-DK"/>
-              <a:t>Need more info</a:t>
-            </a:r>
-            <a:r>
-              <a:rPr lang="da-DK"/>
-              <a:t>? </a:t>
-            </a:r>
-            <a:r>
-              <a:rPr lang="da-DK"/>
-              <a:t>-&gt; </a:t>
-            </a:r>
-            <a:r>
-              <a:rPr lang="da-DK">
-                <a:hlinkClick r:id="rId2"/>
-              </a:rPr>
-              <a:t>https</a:t>
-            </a:r>
-            <a:r>
-              <a:rPr lang="da-DK">
-                <a:hlinkClick r:id="rId2"/>
-              </a:rPr>
-              <a:t>://</a:t>
-            </a:r>
-            <a:r>
-              <a:rPr lang="da-DK" smtClean="0">
-                <a:hlinkClick r:id="rId2"/>
-              </a:rPr>
-              <a:t>www.w3schools.com/html/html5_intro.asp</a:t>
-            </a:r>
-            <a:r>
-              <a:rPr lang="da-DK" smtClean="0"/>
-              <a:t> </a:t>
-            </a:r>
-            <a:endParaRPr lang="da-DK"/>
-          </a:p>
-          <a:p>
-            <a:pPr lvl="1"/>
-            <a:endParaRPr lang="da-DK" smtClean="0"/>
-          </a:p>
-        </p:txBody>
-      </p:sp>
-      <p:sp>
-        <p:nvSpPr>
-          <p:cNvPr id="4" name="AutoShape 2" descr="Billedresultat for html 5 logo"/>
-          <p:cNvSpPr>
-            <a:spLocks noChangeAspect="1" noChangeArrowheads="1"/>
-          </p:cNvSpPr>
-          <p:nvPr/>
-        </p:nvSpPr>
-        <p:spPr bwMode="auto">
-          <a:xfrm>
-            <a:off x="155575" y="-144463"/>
-            <a:ext cx="304800" cy="304801"/>
-          </a:xfrm>
-          <a:prstGeom prst="rect">
-            <a:avLst/>
-          </a:prstGeom>
-          <a:noFill/>
-          <a:extLst>
-            <a:ext uri="{909E8E84-426E-40DD-AFC4-6F175D3DCCD1}">
-              <a14:hiddenFill xmlns:a14="http://schemas.microsoft.com/office/drawing/2010/main">
-                <a:solidFill>
-                  <a:srgbClr val="FFFFFF"/>
-                </a:solidFill>
-              </a14:hiddenFill>
-            </a:ext>
-          </a:extLst>
-        </p:spPr>
-        <p:txBody>
-          <a:bodyPr vert="horz" wrap="square" lIns="91440" tIns="45720" rIns="91440" bIns="45720" numCol="1" anchor="t" anchorCtr="0" compatLnSpc="1">
-            <a:prstTxWarp prst="textNoShape">
-              <a:avLst/>
-            </a:prstTxWarp>
-          </a:bodyPr>
-          <a:lstStyle/>
-          <a:p>
-            <a:endParaRPr lang="da-DK"/>
-          </a:p>
-        </p:txBody>
-      </p:sp>
-      <p:sp>
-        <p:nvSpPr>
-          <p:cNvPr id="5" name="AutoShape 4" descr="Billedresultat for html 5 logo"/>
-          <p:cNvSpPr>
-            <a:spLocks noChangeAspect="1" noChangeArrowheads="1"/>
-          </p:cNvSpPr>
-          <p:nvPr/>
-        </p:nvSpPr>
-        <p:spPr bwMode="auto">
-          <a:xfrm>
-            <a:off x="307975" y="7937"/>
-            <a:ext cx="304800" cy="304801"/>
-          </a:xfrm>
-          <a:prstGeom prst="rect">
-            <a:avLst/>
-          </a:prstGeom>
-          <a:noFill/>
-          <a:extLst>
-            <a:ext uri="{909E8E84-426E-40DD-AFC4-6F175D3DCCD1}">
-              <a14:hiddenFill xmlns:a14="http://schemas.microsoft.com/office/drawing/2010/main">
-                <a:solidFill>
-                  <a:srgbClr val="FFFFFF"/>
-                </a:solidFill>
-              </a14:hiddenFill>
-            </a:ext>
-          </a:extLst>
-        </p:spPr>
-        <p:txBody>
-          <a:bodyPr vert="horz" wrap="square" lIns="91440" tIns="45720" rIns="91440" bIns="45720" numCol="1" anchor="t" anchorCtr="0" compatLnSpc="1">
-            <a:prstTxWarp prst="textNoShape">
-              <a:avLst/>
-            </a:prstTxWarp>
-          </a:bodyPr>
-          <a:lstStyle/>
-          <a:p>
-            <a:endParaRPr lang="da-DK"/>
-          </a:p>
-        </p:txBody>
-      </p:sp>
-      <p:pic>
-        <p:nvPicPr>
-          <p:cNvPr id="6" name="Billede 5"/>
-          <p:cNvPicPr>
-            <a:picLocks noChangeAspect="1"/>
-          </p:cNvPicPr>
-          <p:nvPr/>
-        </p:nvPicPr>
-        <p:blipFill>
-          <a:blip r:embed="rId3"/>
-          <a:stretch>
-            <a:fillRect/>
-          </a:stretch>
-        </p:blipFill>
-        <p:spPr>
-          <a:xfrm>
-            <a:off x="8381228" y="1186377"/>
-            <a:ext cx="3028950" cy="3990975"/>
-          </a:xfrm>
-          <a:prstGeom prst="rect">
-            <a:avLst/>
-          </a:prstGeom>
-        </p:spPr>
-      </p:pic>
-    </p:spTree>
-    <p:extLst>
-      <p:ext uri="{BB962C8B-B14F-4D97-AF65-F5344CB8AC3E}">
-        <p14:creationId xmlns:p14="http://schemas.microsoft.com/office/powerpoint/2010/main" val="3816729098"/>
-      </p:ext>
-    </p:extLst>
-  </p:cSld>
-  <p:clrMapOvr>
-    <a:masterClrMapping/>
-  </p:clrMapOvr>
-  <p:timing>
-    <p:tnLst>
-      <p:par>
-        <p:cTn id="1" dur="indefinite" restart="never" nodeType="tmRoot"/>
-      </p:par>
-    </p:tnLst>
-  </p:timing>
-</p:sld>
-</file>
-
 <file path=ppt/slides/slide18.xml><?xml version="1.0" encoding="utf-8"?>
 <p:sld xmlns:a="http://schemas.openxmlformats.org/drawingml/2006/main" xmlns:r="http://schemas.openxmlformats.org/officeDocument/2006/relationships" xmlns:p="http://schemas.openxmlformats.org/presentationml/2006/main">
   <p:cSld>
@@ -4735,7 +4707,7 @@
           <a:p>
             <a:r>
               <a:rPr lang="da-DK" b="1" smtClean="0"/>
-              <a:t>Example: SemanticTag</a:t>
+              <a:t>Example: HTML5CSS3</a:t>
             </a:r>
             <a:endParaRPr lang="da-DK" b="1"/>
           </a:p>
@@ -4756,16 +4728,6 @@
           <a:bodyPr/>
           <a:lstStyle/>
           <a:p>
-            <a:r>
-              <a:rPr lang="da-DK" smtClean="0"/>
-              <a:t>Hello, 2019 </a:t>
-            </a:r>
-            <a:r>
-              <a:rPr lang="da-DK" smtClean="0">
-                <a:sym typeface="Wingdings" panose="05000000000000000000" pitchFamily="2" charset="2"/>
-              </a:rPr>
-              <a:t></a:t>
-            </a:r>
             <a:endParaRPr lang="da-DK"/>
           </a:p>
         </p:txBody>
@@ -4773,7 +4735,7 @@
     </p:spTree>
     <p:extLst>
       <p:ext uri="{BB962C8B-B14F-4D97-AF65-F5344CB8AC3E}">
-        <p14:creationId xmlns:p14="http://schemas.microsoft.com/office/powerpoint/2010/main" val="995448951"/>
+        <p14:creationId xmlns:p14="http://schemas.microsoft.com/office/powerpoint/2010/main" val="3695911945"/>
       </p:ext>
     </p:extLst>
   </p:cSld>
@@ -5045,7 +5007,7 @@
           <a:p>
             <a:r>
               <a:rPr lang="da-DK" b="1" smtClean="0"/>
-              <a:t>Example: TestHTML4 (no CSS)</a:t>
+              <a:t>Example: HTML4NoCSS</a:t>
             </a:r>
             <a:endParaRPr lang="da-DK" b="1"/>
           </a:p>
@@ -5066,16 +5028,9 @@
           <a:bodyPr/>
           <a:lstStyle/>
           <a:p>
-            <a:r>
-              <a:rPr lang="da-DK" smtClean="0"/>
-              <a:t>Hello, 1991 </a:t>
-            </a:r>
-            <a:r>
-              <a:rPr lang="da-DK" smtClean="0">
-                <a:sym typeface="Wingdings" panose="05000000000000000000" pitchFamily="2" charset="2"/>
-              </a:rPr>
-              <a:t></a:t>
-            </a:r>
+            <a:pPr marL="0" indent="0">
+              <a:buNone/>
+            </a:pPr>
             <a:endParaRPr lang="da-DK"/>
           </a:p>
         </p:txBody>
@@ -5386,13 +5341,7 @@
               <a:rPr lang="da-DK">
                 <a:hlinkClick r:id="rId2"/>
               </a:rPr>
-              <a:t>https</a:t>
-            </a:r>
-            <a:r>
-              <a:rPr lang="da-DK">
-                <a:hlinkClick r:id="rId2"/>
-              </a:rPr>
-              <a:t>://</a:t>
+              <a:t>https://</a:t>
             </a:r>
             <a:r>
               <a:rPr lang="da-DK" smtClean="0">
@@ -5503,9 +5452,9 @@
           <a:p>
             <a:r>
               <a:rPr lang="da-DK" b="1" smtClean="0"/>
-              <a:t>JavaScript</a:t>
-            </a:r>
-            <a:endParaRPr lang="da-DK"/>
+              <a:t>Example: JavaScriptExample</a:t>
+            </a:r>
+            <a:endParaRPr lang="da-DK" b="1"/>
           </a:p>
         </p:txBody>
       </p:sp>
@@ -5519,123 +5468,11 @@
             <p:ph idx="1"/>
           </p:nvPr>
         </p:nvSpPr>
-        <p:spPr>
-          <a:xfrm>
-            <a:off x="838200" y="1825625"/>
-            <a:ext cx="9862751" cy="4351338"/>
-          </a:xfrm>
-        </p:spPr>
-        <p:txBody>
-          <a:bodyPr>
-            <a:normAutofit/>
-          </a:bodyPr>
-          <a:lstStyle/>
-          <a:p>
-            <a:r>
-              <a:rPr lang="da-DK" b="1" smtClean="0"/>
-              <a:t>JavaScript</a:t>
-            </a:r>
-            <a:r>
-              <a:rPr lang="da-DK" smtClean="0"/>
-              <a:t> can be written </a:t>
-            </a:r>
-          </a:p>
-          <a:p>
-            <a:pPr lvl="1"/>
-            <a:r>
-              <a:rPr lang="da-DK"/>
-              <a:t>I</a:t>
-            </a:r>
-            <a:r>
-              <a:rPr lang="da-DK" smtClean="0"/>
-              <a:t>nside tags (typically event handlers)</a:t>
-            </a:r>
-          </a:p>
-          <a:p>
-            <a:pPr lvl="1"/>
-            <a:r>
-              <a:rPr lang="da-DK" smtClean="0"/>
-              <a:t>Inside .html documents (inside &lt;script&gt; tags)</a:t>
-            </a:r>
-          </a:p>
-          <a:p>
-            <a:pPr lvl="1"/>
-            <a:r>
-              <a:rPr lang="da-DK" smtClean="0"/>
-              <a:t>In separate files</a:t>
-            </a:r>
-          </a:p>
-          <a:p>
-            <a:r>
-              <a:rPr lang="da-DK" b="1" smtClean="0"/>
-              <a:t>JavaScript</a:t>
-            </a:r>
-            <a:r>
-              <a:rPr lang="da-DK" smtClean="0"/>
-              <a:t> is now used much more broadly than for simple page interactivity scripting.</a:t>
-            </a:r>
-          </a:p>
-          <a:p>
-            <a:r>
-              <a:rPr lang="da-DK" b="1" smtClean="0"/>
-              <a:t>React </a:t>
-            </a:r>
-            <a:r>
-              <a:rPr lang="da-DK" smtClean="0"/>
-              <a:t>and </a:t>
-            </a:r>
-            <a:r>
-              <a:rPr lang="da-DK" b="1" smtClean="0"/>
-              <a:t>Angular</a:t>
-            </a:r>
-            <a:r>
-              <a:rPr lang="da-DK" smtClean="0"/>
-              <a:t> are examples of </a:t>
-            </a:r>
-            <a:r>
-              <a:rPr lang="da-DK" b="1" smtClean="0"/>
-              <a:t>JavaScript frameworks</a:t>
-            </a:r>
-            <a:r>
-              <a:rPr lang="da-DK" smtClean="0"/>
-              <a:t> </a:t>
-            </a:r>
-          </a:p>
-          <a:p>
-            <a:r>
-              <a:rPr lang="da-DK"/>
-              <a:t>Need more info</a:t>
-            </a:r>
-            <a:r>
-              <a:rPr lang="da-DK"/>
-              <a:t>? </a:t>
-            </a:r>
-            <a:r>
-              <a:rPr lang="da-DK"/>
-              <a:t>-&gt; </a:t>
-            </a:r>
-            <a:r>
-              <a:rPr lang="da-DK">
-                <a:hlinkClick r:id="rId2"/>
-              </a:rPr>
-              <a:t>https</a:t>
-            </a:r>
-            <a:r>
-              <a:rPr lang="da-DK">
-                <a:hlinkClick r:id="rId2"/>
-              </a:rPr>
-              <a:t>://</a:t>
-            </a:r>
-            <a:r>
-              <a:rPr lang="da-DK" smtClean="0">
-                <a:hlinkClick r:id="rId2"/>
-              </a:rPr>
-              <a:t>www.w3schools.com/js/default.asp</a:t>
-            </a:r>
-            <a:r>
-              <a:rPr lang="da-DK" smtClean="0"/>
-              <a:t> </a:t>
-            </a:r>
+        <p:spPr/>
+        <p:txBody>
+          <a:bodyPr/>
+          <a:lstStyle/>
+          <a:p>
             <a:endParaRPr lang="da-DK"/>
           </a:p>
         </p:txBody>
@@ -5643,7 +5480,7 @@
     </p:spTree>
     <p:extLst>
       <p:ext uri="{BB962C8B-B14F-4D97-AF65-F5344CB8AC3E}">
-        <p14:creationId xmlns:p14="http://schemas.microsoft.com/office/powerpoint/2010/main" val="1756467985"/>
+        <p14:creationId xmlns:p14="http://schemas.microsoft.com/office/powerpoint/2010/main" val="3822668600"/>
       </p:ext>
     </p:extLst>
   </p:cSld>
@@ -5679,6 +5516,183 @@
       </p:grpSpPr>
       <p:sp>
         <p:nvSpPr>
+          <p:cNvPr id="2" name="Titel 1"/>
+          <p:cNvSpPr>
+            <a:spLocks noGrp="1"/>
+          </p:cNvSpPr>
+          <p:nvPr>
+            <p:ph type="title"/>
+          </p:nvPr>
+        </p:nvSpPr>
+        <p:spPr/>
+        <p:txBody>
+          <a:bodyPr/>
+          <a:lstStyle/>
+          <a:p>
+            <a:r>
+              <a:rPr lang="da-DK" b="1" smtClean="0"/>
+              <a:t>JavaScript</a:t>
+            </a:r>
+            <a:endParaRPr lang="da-DK"/>
+          </a:p>
+        </p:txBody>
+      </p:sp>
+      <p:sp>
+        <p:nvSpPr>
+          <p:cNvPr id="3" name="Pladsholder til indhold 2"/>
+          <p:cNvSpPr>
+            <a:spLocks noGrp="1"/>
+          </p:cNvSpPr>
+          <p:nvPr>
+            <p:ph idx="1"/>
+          </p:nvPr>
+        </p:nvSpPr>
+        <p:spPr>
+          <a:xfrm>
+            <a:off x="838200" y="1825625"/>
+            <a:ext cx="9862751" cy="4351338"/>
+          </a:xfrm>
+        </p:spPr>
+        <p:txBody>
+          <a:bodyPr>
+            <a:normAutofit/>
+          </a:bodyPr>
+          <a:lstStyle/>
+          <a:p>
+            <a:r>
+              <a:rPr lang="da-DK" b="1" smtClean="0"/>
+              <a:t>JavaScript</a:t>
+            </a:r>
+            <a:r>
+              <a:rPr lang="da-DK" smtClean="0"/>
+              <a:t> can be written </a:t>
+            </a:r>
+          </a:p>
+          <a:p>
+            <a:pPr lvl="1"/>
+            <a:r>
+              <a:rPr lang="da-DK"/>
+              <a:t>I</a:t>
+            </a:r>
+            <a:r>
+              <a:rPr lang="da-DK" smtClean="0"/>
+              <a:t>nside tags (typically event handlers)</a:t>
+            </a:r>
+          </a:p>
+          <a:p>
+            <a:pPr lvl="1"/>
+            <a:r>
+              <a:rPr lang="da-DK" smtClean="0"/>
+              <a:t>Inside .html documents (inside &lt;script&gt; tags)</a:t>
+            </a:r>
+          </a:p>
+          <a:p>
+            <a:pPr lvl="1"/>
+            <a:r>
+              <a:rPr lang="da-DK" smtClean="0"/>
+              <a:t>In separate files</a:t>
+            </a:r>
+          </a:p>
+          <a:p>
+            <a:r>
+              <a:rPr lang="da-DK" b="1" smtClean="0"/>
+              <a:t>JavaScript</a:t>
+            </a:r>
+            <a:r>
+              <a:rPr lang="da-DK" smtClean="0"/>
+              <a:t> is now used much more broadly than for simple page interactivity scripting.</a:t>
+            </a:r>
+          </a:p>
+          <a:p>
+            <a:r>
+              <a:rPr lang="da-DK" b="1" smtClean="0"/>
+              <a:t>React </a:t>
+            </a:r>
+            <a:r>
+              <a:rPr lang="da-DK" smtClean="0"/>
+              <a:t>and </a:t>
+            </a:r>
+            <a:r>
+              <a:rPr lang="da-DK" b="1" smtClean="0"/>
+              <a:t>Angular</a:t>
+            </a:r>
+            <a:r>
+              <a:rPr lang="da-DK" smtClean="0"/>
+              <a:t> are examples of </a:t>
+            </a:r>
+            <a:r>
+              <a:rPr lang="da-DK" b="1" smtClean="0"/>
+              <a:t>JavaScript frameworks</a:t>
+            </a:r>
+            <a:r>
+              <a:rPr lang="da-DK" smtClean="0"/>
+              <a:t> </a:t>
+            </a:r>
+          </a:p>
+          <a:p>
+            <a:r>
+              <a:rPr lang="da-DK"/>
+              <a:t>Need more info? -&gt; </a:t>
+            </a:r>
+            <a:r>
+              <a:rPr lang="da-DK">
+                <a:hlinkClick r:id="rId2"/>
+              </a:rPr>
+              <a:t>https://</a:t>
+            </a:r>
+            <a:r>
+              <a:rPr lang="da-DK" smtClean="0">
+                <a:hlinkClick r:id="rId2"/>
+              </a:rPr>
+              <a:t>www.w3schools.com/js/default.asp</a:t>
+            </a:r>
+            <a:r>
+              <a:rPr lang="da-DK" smtClean="0"/>
+              <a:t> </a:t>
+            </a:r>
+            <a:endParaRPr lang="da-DK"/>
+          </a:p>
+        </p:txBody>
+      </p:sp>
+    </p:spTree>
+    <p:extLst>
+      <p:ext uri="{BB962C8B-B14F-4D97-AF65-F5344CB8AC3E}">
+        <p14:creationId xmlns:p14="http://schemas.microsoft.com/office/powerpoint/2010/main" val="1756467985"/>
+      </p:ext>
+    </p:extLst>
+  </p:cSld>
+  <p:clrMapOvr>
+    <a:masterClrMapping/>
+  </p:clrMapOvr>
+  <p:timing>
+    <p:tnLst>
+      <p:par>
+        <p:cTn id="1" dur="indefinite" restart="never" nodeType="tmRoot"/>
+      </p:par>
+    </p:tnLst>
+  </p:timing>
+</p:sld>
+</file>
+
+<file path=ppt/slides/slide24.xml><?xml version="1.0" encoding="utf-8"?>
+<p:sld xmlns:a="http://schemas.openxmlformats.org/drawingml/2006/main" xmlns:r="http://schemas.openxmlformats.org/officeDocument/2006/relationships" xmlns:p="http://schemas.openxmlformats.org/presentationml/2006/main">
+  <p:cSld>
+    <p:spTree>
+      <p:nvGrpSpPr>
+        <p:cNvPr id="1" name=""/>
+        <p:cNvGrpSpPr/>
+        <p:nvPr/>
+      </p:nvGrpSpPr>
+      <p:grpSpPr>
+        <a:xfrm>
+          <a:off x="0" y="0"/>
+          <a:ext cx="0" cy="0"/>
+          <a:chOff x="0" y="0"/>
+          <a:chExt cx="0" cy="0"/>
+        </a:xfrm>
+      </p:grpSpPr>
+      <p:sp>
+        <p:nvSpPr>
           <p:cNvPr id="4" name="Ellipse 3"/>
           <p:cNvSpPr/>
           <p:nvPr/>
@@ -5929,7 +5943,7 @@
 </p:sld>
 </file>
 
-<file path=ppt/slides/slide24.xml><?xml version="1.0" encoding="utf-8"?>
+<file path=ppt/slides/slide25.xml><?xml version="1.0" encoding="utf-8"?>
 <p:sld xmlns:a="http://schemas.openxmlformats.org/drawingml/2006/main" xmlns:r="http://schemas.openxmlformats.org/officeDocument/2006/relationships" xmlns:p="http://schemas.openxmlformats.org/presentationml/2006/main">
   <p:cSld>
     <p:spTree>
@@ -6134,11 +6148,11 @@
           <a:p>
             <a:r>
               <a:rPr lang="da-DK" b="1" smtClean="0"/>
-              <a:t>Example: TestHTML4 </a:t>
+              <a:t>Example: </a:t>
             </a:r>
             <a:r>
               <a:rPr lang="da-DK" b="1"/>
-              <a:t>(no CSS) </a:t>
+              <a:t>HTML4NoCSS </a:t>
             </a:r>
             <a:r>
               <a:rPr lang="da-DK" b="1" smtClean="0"/>
@@ -6377,11 +6391,7 @@
           <a:p>
             <a:r>
               <a:rPr lang="da-DK"/>
-              <a:t>Need more info</a:t>
-            </a:r>
-            <a:r>
-              <a:rPr lang="da-DK"/>
-              <a:t>? </a:t>
+              <a:t>Need more info? </a:t>
             </a:r>
             <a:r>
               <a:rPr lang="da-DK" smtClean="0"/>
@@ -6868,7 +6878,7 @@
           <a:p>
             <a:r>
               <a:rPr lang="da-DK" b="1" smtClean="0"/>
-              <a:t>Example: TestHTML4</a:t>
+              <a:t>Example: HTML4WithCSS</a:t>
             </a:r>
             <a:endParaRPr lang="da-DK" b="1"/>
           </a:p>
@@ -6889,16 +6899,9 @@
           <a:bodyPr/>
           <a:lstStyle/>
           <a:p>
-            <a:r>
-              <a:rPr lang="da-DK" smtClean="0"/>
-              <a:t>Hello, 1995 </a:t>
-            </a:r>
-            <a:r>
-              <a:rPr lang="da-DK" smtClean="0">
-                <a:sym typeface="Wingdings" panose="05000000000000000000" pitchFamily="2" charset="2"/>
-              </a:rPr>
-              <a:t></a:t>
-            </a:r>
+            <a:pPr marL="0" indent="0">
+              <a:buNone/>
+            </a:pPr>
             <a:endParaRPr lang="da-DK"/>
           </a:p>
         </p:txBody>
@@ -6957,7 +6960,15 @@
           <a:p>
             <a:r>
               <a:rPr lang="da-DK" b="1" smtClean="0"/>
-              <a:t>Example: TestHTML4 - review</a:t>
+              <a:t>Example: </a:t>
+            </a:r>
+            <a:r>
+              <a:rPr lang="da-DK" b="1"/>
+              <a:t>HTML4WithCSS </a:t>
+            </a:r>
+            <a:r>
+              <a:rPr lang="da-DK" b="1" smtClean="0"/>
+              <a:t>- review</a:t>
             </a:r>
             <a:endParaRPr lang="da-DK" b="1"/>
           </a:p>

</xml_diff>